<commit_message>
j'ai rater  c'est mieu
</commit_message>
<xml_diff>
--- a/Livrables/18_03_2022_Presentation_R2.10/projet13BUTInfo20212022Semestre2.pptx
+++ b/Livrables/18_03_2022_Presentation_R2.10/projet13BUTInfo20212022Semestre2.pptx
@@ -5911,7 +5911,12 @@
             <p:ph idx="1"/>
           </p:nvPr>
         </p:nvSpPr>
-        <p:spPr/>
+        <p:spPr>
+          <a:xfrm>
+            <a:off x="1050879" y="1820866"/>
+            <a:ext cx="9810604" cy="4428753"/>
+          </a:xfrm>
+        </p:spPr>
         <p:txBody>
           <a:bodyPr/>
           <a:lstStyle/>
@@ -5928,10 +5933,10 @@
       </p:sp>
       <p:pic>
         <p:nvPicPr>
-          <p:cNvPr id="12" name="Picture 8">
-            <a:extLst>
-              <a:ext uri="{FF2B5EF4-FFF2-40B4-BE49-F238E27FC236}">
-                <a16:creationId xmlns:a16="http://schemas.microsoft.com/office/drawing/2014/main" id="{BADFD8FA-2B4D-495D-94B1-C913050FC6C7}"/>
+          <p:cNvPr id="1026" name="Picture 2">
+            <a:extLst>
+              <a:ext uri="{FF2B5EF4-FFF2-40B4-BE49-F238E27FC236}">
+                <a16:creationId xmlns:a16="http://schemas.microsoft.com/office/drawing/2014/main" id="{1245FF4D-225E-4A67-93C2-2A8E78C8EEE8}"/>
               </a:ext>
             </a:extLst>
           </p:cNvPr>
@@ -5948,13 +5953,13 @@
               </a:ext>
             </a:extLst>
           </a:blip>
-          <a:srcRect t="4363"/>
+          <a:srcRect t="3788"/>
           <a:stretch/>
         </p:blipFill>
         <p:spPr bwMode="auto">
           <a:xfrm>
-            <a:off x="4890896" y="224881"/>
-            <a:ext cx="5970587" cy="6558786"/>
+            <a:off x="4815621" y="98704"/>
+            <a:ext cx="5970587" cy="6598200"/>
           </a:xfrm>
           <a:prstGeom prst="rect">
             <a:avLst/>

</xml_diff>

<commit_message>
FINALEMENT CA Y EST
</commit_message>
<xml_diff>
--- a/Livrables/18_03_2022_Presentation_R2.10/projet13BUTInfo20212022Semestre2.pptx
+++ b/Livrables/18_03_2022_Presentation_R2.10/projet13BUTInfo20212022Semestre2.pptx
@@ -8,11 +8,10 @@
     <p:sldId id="256" r:id="rId2"/>
     <p:sldId id="258" r:id="rId3"/>
     <p:sldId id="259" r:id="rId4"/>
-    <p:sldId id="264" r:id="rId5"/>
-    <p:sldId id="260" r:id="rId6"/>
-    <p:sldId id="263" r:id="rId7"/>
-    <p:sldId id="257" r:id="rId8"/>
-    <p:sldId id="262" r:id="rId9"/>
+    <p:sldId id="260" r:id="rId5"/>
+    <p:sldId id="263" r:id="rId6"/>
+    <p:sldId id="266" r:id="rId7"/>
+    <p:sldId id="264" r:id="rId8"/>
   </p:sldIdLst>
   <p:sldSz cx="12192000" cy="6858000"/>
   <p:notesSz cx="6858000" cy="9144000"/>
@@ -305,7 +304,7 @@
           <a:p>
             <a:fld id="{91F9259A-1FE3-4FF9-8A07-BDD8177164ED}" type="datetime4">
               <a:rPr lang="en-US" smtClean="0"/>
-              <a:t>March 17, 2022</a:t>
+              <a:t>March 18, 2022</a:t>
             </a:fld>
             <a:endParaRPr lang="en-US"/>
           </a:p>
@@ -480,7 +479,7 @@
           <a:p>
             <a:fld id="{E5CC3C8F-D4A7-4EAD-92AD-82C91CB8BB85}" type="datetime4">
               <a:rPr lang="en-US" smtClean="0"/>
-              <a:t>March 17, 2022</a:t>
+              <a:t>March 18, 2022</a:t>
             </a:fld>
             <a:endParaRPr lang="en-US"/>
           </a:p>
@@ -717,7 +716,7 @@
           <a:p>
             <a:fld id="{BC011D41-E33C-4BC7-8272-37E8417FD097}" type="datetime4">
               <a:rPr lang="en-US" smtClean="0"/>
-              <a:t>March 17, 2022</a:t>
+              <a:t>March 18, 2022</a:t>
             </a:fld>
             <a:endParaRPr lang="en-US"/>
           </a:p>
@@ -922,7 +921,7 @@
           <a:p>
             <a:fld id="{5D340FED-6E95-4177-A7EF-CD303B9E611D}" type="datetime4">
               <a:rPr lang="en-US" smtClean="0"/>
-              <a:t>March 17, 2022</a:t>
+              <a:t>March 18, 2022</a:t>
             </a:fld>
             <a:endParaRPr lang="en-US"/>
           </a:p>
@@ -1212,7 +1211,7 @@
           <a:p>
             <a:fld id="{477962CB-39AD-45A9-800F-54DAB53D6021}" type="datetime4">
               <a:rPr lang="en-US" smtClean="0"/>
-              <a:t>March 17, 2022</a:t>
+              <a:t>March 18, 2022</a:t>
             </a:fld>
             <a:endParaRPr lang="en-US"/>
           </a:p>
@@ -1496,7 +1495,7 @@
           <a:p>
             <a:fld id="{2DEDF93D-55AB-4606-B9D7-742F1FC51983}" type="datetime4">
               <a:rPr lang="en-US" smtClean="0"/>
-              <a:t>March 17, 2022</a:t>
+              <a:t>March 18, 2022</a:t>
             </a:fld>
             <a:endParaRPr lang="en-US" dirty="0"/>
           </a:p>
@@ -1913,7 +1912,7 @@
           <a:p>
             <a:fld id="{DDF2841D-FB5C-47AB-B2FF-32E855C1EA71}" type="datetime4">
               <a:rPr lang="en-US" smtClean="0"/>
-              <a:t>March 17, 2022</a:t>
+              <a:t>March 18, 2022</a:t>
             </a:fld>
             <a:endParaRPr lang="en-US"/>
           </a:p>
@@ -2054,7 +2053,7 @@
           <a:p>
             <a:fld id="{118537E9-D174-424D-BEE8-AFC4CA5F9F97}" type="datetime4">
               <a:rPr lang="en-US" smtClean="0"/>
-              <a:t>March 17, 2022</a:t>
+              <a:t>March 18, 2022</a:t>
             </a:fld>
             <a:endParaRPr lang="en-US"/>
           </a:p>
@@ -2195,7 +2194,7 @@
           <a:p>
             <a:fld id="{1C7A44C0-F7AC-49C2-8289-1E7A86D9FB50}" type="datetime4">
               <a:rPr lang="en-US" smtClean="0"/>
-              <a:t>March 17, 2022</a:t>
+              <a:t>March 18, 2022</a:t>
             </a:fld>
             <a:endParaRPr lang="en-US"/>
           </a:p>
@@ -2510,7 +2509,7 @@
           <a:p>
             <a:fld id="{73BB84BC-6E78-40D1-8831-40AB1F596614}" type="datetime4">
               <a:rPr lang="en-US" smtClean="0"/>
-              <a:t>March 17, 2022</a:t>
+              <a:t>March 18, 2022</a:t>
             </a:fld>
             <a:endParaRPr lang="en-US"/>
           </a:p>
@@ -2803,7 +2802,7 @@
           <a:p>
             <a:fld id="{ADFA080F-3961-4D42-BEDE-84A1FED032F1}" type="datetime4">
               <a:rPr lang="en-US" smtClean="0"/>
-              <a:t>March 17, 2022</a:t>
+              <a:t>March 18, 2022</a:t>
             </a:fld>
             <a:endParaRPr lang="en-US"/>
           </a:p>
@@ -3085,7 +3084,7 @@
             <a:fld id="{A33960BD-7AC1-4217-9611-AAA56D3EE38F}" type="datetime4">
               <a:rPr lang="en-US" smtClean="0"/>
               <a:pPr/>
-              <a:t>March 17, 2022</a:t>
+              <a:t>March 18, 2022</a:t>
             </a:fld>
             <a:endParaRPr lang="en-US" dirty="0">
               <a:latin typeface="+mn-lt"/>
@@ -3594,147 +3593,6 @@
           <a:chExt cx="0" cy="0"/>
         </a:xfrm>
       </p:grpSpPr>
-      <p:sp useBgFill="1">
-        <p:nvSpPr>
-          <p:cNvPr id="73" name="Rectangle 72">
-            <a:extLst>
-              <a:ext uri="{FF2B5EF4-FFF2-40B4-BE49-F238E27FC236}">
-                <a16:creationId xmlns:a16="http://schemas.microsoft.com/office/drawing/2014/main" id="{7DA3C418-758E-4180-A5D0-8655D6804587}"/>
-              </a:ext>
-              <a:ext uri="{C183D7F6-B498-43B3-948B-1728B52AA6E4}">
-                <adec:decorative xmlns:adec="http://schemas.microsoft.com/office/drawing/2017/decorative" val="1"/>
-              </a:ext>
-            </a:extLst>
-          </p:cNvPr>
-          <p:cNvSpPr>
-            <a:spLocks noGrp="1" noRot="1" noChangeAspect="1" noMove="1" noResize="1" noEditPoints="1" noAdjustHandles="1" noChangeArrowheads="1" noChangeShapeType="1" noTextEdit="1"/>
-          </p:cNvSpPr>
-          <p:nvPr>
-            <p:extLst>
-              <p:ext uri="{386F3935-93C4-4BCD-93E2-E3B085C9AB24}">
-                <p16:designElem xmlns:p16="http://schemas.microsoft.com/office/powerpoint/2015/main" val="1"/>
-              </p:ext>
-            </p:extLst>
-          </p:nvPr>
-        </p:nvSpPr>
-        <p:spPr>
-          <a:xfrm>
-            <a:off x="0" y="0"/>
-            <a:ext cx="12192000" cy="6858000"/>
-          </a:xfrm>
-          <a:prstGeom prst="rect">
-            <a:avLst/>
-          </a:prstGeom>
-          <a:ln w="12700" cap="flat" cmpd="sng" algn="ctr">
-            <a:noFill/>
-            <a:prstDash val="solid"/>
-            <a:miter lim="800000"/>
-          </a:ln>
-          <a:effectLst/>
-          <a:extLst>
-            <a:ext uri="{91240B29-F687-4F45-9708-019B960494DF}">
-              <a14:hiddenLine xmlns:a14="http://schemas.microsoft.com/office/drawing/2010/main" w="12700" cap="flat" cmpd="sng" algn="ctr">
-                <a:solidFill>
-                  <a:schemeClr val="accent1">
-                    <a:shade val="50000"/>
-                  </a:schemeClr>
-                </a:solidFill>
-                <a:prstDash val="solid"/>
-                <a:miter lim="800000"/>
-              </a14:hiddenLine>
-            </a:ext>
-          </a:extLst>
-        </p:spPr>
-        <p:style>
-          <a:lnRef idx="2">
-            <a:schemeClr val="accent1">
-              <a:shade val="50000"/>
-            </a:schemeClr>
-          </a:lnRef>
-          <a:fillRef idx="1">
-            <a:schemeClr val="accent1"/>
-          </a:fillRef>
-          <a:effectRef idx="0">
-            <a:schemeClr val="accent1"/>
-          </a:effectRef>
-          <a:fontRef idx="minor">
-            <a:schemeClr val="lt1"/>
-          </a:fontRef>
-        </p:style>
-        <p:txBody>
-          <a:bodyPr rtlCol="0" anchor="ctr"/>
-          <a:lstStyle/>
-          <a:p>
-            <a:pPr algn="ctr"/>
-            <a:endParaRPr lang="en-US"/>
-          </a:p>
-        </p:txBody>
-      </p:sp>
-      <p:sp>
-        <p:nvSpPr>
-          <p:cNvPr id="75" name="Rectangle 74">
-            <a:extLst>
-              <a:ext uri="{FF2B5EF4-FFF2-40B4-BE49-F238E27FC236}">
-                <a16:creationId xmlns:a16="http://schemas.microsoft.com/office/drawing/2014/main" id="{28C8EF06-5EC3-4883-AFAF-D74FF46550FB}"/>
-              </a:ext>
-              <a:ext uri="{C183D7F6-B498-43B3-948B-1728B52AA6E4}">
-                <adec:decorative xmlns:adec="http://schemas.microsoft.com/office/drawing/2017/decorative" val="1"/>
-              </a:ext>
-            </a:extLst>
-          </p:cNvPr>
-          <p:cNvSpPr>
-            <a:spLocks noGrp="1" noRot="1" noChangeAspect="1" noMove="1" noResize="1" noEditPoints="1" noAdjustHandles="1" noChangeArrowheads="1" noChangeShapeType="1" noTextEdit="1"/>
-          </p:cNvSpPr>
-          <p:nvPr>
-            <p:extLst>
-              <p:ext uri="{386F3935-93C4-4BCD-93E2-E3B085C9AB24}">
-                <p16:designElem xmlns:p16="http://schemas.microsoft.com/office/powerpoint/2015/main" val="1"/>
-              </p:ext>
-            </p:extLst>
-          </p:nvPr>
-        </p:nvSpPr>
-        <p:spPr>
-          <a:xfrm>
-            <a:off x="0" y="0"/>
-            <a:ext cx="5135971" cy="6871648"/>
-          </a:xfrm>
-          <a:prstGeom prst="rect">
-            <a:avLst/>
-          </a:prstGeom>
-          <a:solidFill>
-            <a:srgbClr val="82766A">
-              <a:alpha val="15000"/>
-            </a:srgbClr>
-          </a:solidFill>
-          <a:ln>
-            <a:noFill/>
-          </a:ln>
-        </p:spPr>
-        <p:style>
-          <a:lnRef idx="2">
-            <a:schemeClr val="accent1">
-              <a:shade val="50000"/>
-            </a:schemeClr>
-          </a:lnRef>
-          <a:fillRef idx="1">
-            <a:schemeClr val="accent1"/>
-          </a:fillRef>
-          <a:effectRef idx="0">
-            <a:schemeClr val="accent1"/>
-          </a:effectRef>
-          <a:fontRef idx="minor">
-            <a:schemeClr val="lt1"/>
-          </a:fontRef>
-        </p:style>
-        <p:txBody>
-          <a:bodyPr rtlCol="0" anchor="ctr"/>
-          <a:lstStyle/>
-          <a:p>
-            <a:pPr algn="ctr"/>
-            <a:endParaRPr lang="en-US"/>
-          </a:p>
-        </p:txBody>
-      </p:sp>
       <p:pic>
         <p:nvPicPr>
           <p:cNvPr id="1028" name="Picture 4">
@@ -3750,7 +3608,7 @@
           <p:nvPr/>
         </p:nvPicPr>
         <p:blipFill rotWithShape="1">
-          <a:blip r:embed="rId2">
+          <a:blip r:embed="rId3">
             <a:extLst>
               <a:ext uri="{28A0092B-C50C-407E-A947-70E740481C1C}">
                 <a14:useLocalDpi xmlns:a14="http://schemas.microsoft.com/office/drawing/2010/main" val="0"/>
@@ -4637,7 +4495,7 @@
           <p:nvPr/>
         </p:nvPicPr>
         <p:blipFill>
-          <a:blip r:embed="rId3" cstate="hqprint">
+          <a:blip r:embed="rId4" cstate="hqprint">
             <a:extLst>
               <a:ext uri="{28A0092B-C50C-407E-A947-70E740481C1C}">
                 <a14:useLocalDpi xmlns:a14="http://schemas.microsoft.com/office/drawing/2010/main" val="0"/>
@@ -4918,7 +4776,7 @@
                 <a:ea typeface="Liberation Sans" panose="020B0604020202020204" pitchFamily="34" charset="0"/>
                 <a:cs typeface="Liberation Sans" panose="020B0604020202020204" pitchFamily="34" charset="0"/>
               </a:rPr>
-              <a:t>1 / 8</a:t>
+              <a:t>1 / 7</a:t>
             </a:r>
           </a:p>
         </p:txBody>
@@ -4931,7 +4789,7 @@
     </p:extLst>
   </p:cSld>
   <p:clrMapOvr>
-    <a:masterClrMapping/>
+    <a:overrideClrMapping bg1="lt1" tx1="dk1" bg2="lt2" tx2="dk2" accent1="accent1" accent2="accent2" accent3="accent3" accent4="accent4" accent5="accent5" accent6="accent6" hlink="hlink" folHlink="folHlink"/>
   </p:clrMapOvr>
 </p:sld>
 </file>
@@ -5289,7 +5147,7 @@
                 <a:ea typeface="Liberation Sans" panose="020B0604020202020204" pitchFamily="34" charset="0"/>
                 <a:cs typeface="Liberation Sans" panose="020B0604020202020204" pitchFamily="34" charset="0"/>
               </a:rPr>
-              <a:t>2 / 8</a:t>
+              <a:t>2 / 7</a:t>
             </a:r>
           </a:p>
         </p:txBody>
@@ -5336,8 +5194,8 @@
         </p:nvSpPr>
         <p:spPr>
           <a:xfrm>
-            <a:off x="4887883" y="248346"/>
-            <a:ext cx="2069869" cy="430529"/>
+            <a:off x="3458094" y="234488"/>
+            <a:ext cx="4929448" cy="430529"/>
           </a:xfrm>
         </p:spPr>
         <p:txBody>
@@ -5346,10 +5204,14 @@
           </a:bodyPr>
           <a:lstStyle/>
           <a:p>
-            <a:pPr algn="ctr"/>
+            <a:pPr algn="ctr">
+              <a:tabLst>
+                <a:tab pos="989013" algn="l"/>
+              </a:tabLst>
+            </a:pPr>
             <a:r>
               <a:rPr lang="fr-FR" sz="3200" cap="none" spc="0" dirty="0"/>
-              <a:t>Acteurs</a:t>
+              <a:t>Acteurs (et services proposés)</a:t>
             </a:r>
           </a:p>
         </p:txBody>
@@ -5967,7 +5829,7 @@
                 <a:ea typeface="Liberation Sans" panose="020B0604020202020204" pitchFamily="34" charset="0"/>
                 <a:cs typeface="Liberation Sans" panose="020B0604020202020204" pitchFamily="34" charset="0"/>
               </a:rPr>
-              <a:t>3 / 8</a:t>
+              <a:t>3 / 7</a:t>
             </a:r>
           </a:p>
         </p:txBody>
@@ -5986,531 +5848,6 @@
 </file>
 
 <file path=ppt/slides/slide4.xml><?xml version="1.0" encoding="utf-8"?>
-<p:sld xmlns:a="http://schemas.openxmlformats.org/drawingml/2006/main" xmlns:r="http://schemas.openxmlformats.org/officeDocument/2006/relationships" xmlns:p="http://schemas.openxmlformats.org/presentationml/2006/main">
-  <p:cSld>
-    <p:spTree>
-      <p:nvGrpSpPr>
-        <p:cNvPr id="1" name=""/>
-        <p:cNvGrpSpPr/>
-        <p:nvPr/>
-      </p:nvGrpSpPr>
-      <p:grpSpPr>
-        <a:xfrm>
-          <a:off x="0" y="0"/>
-          <a:ext cx="0" cy="0"/>
-          <a:chOff x="0" y="0"/>
-          <a:chExt cx="0" cy="0"/>
-        </a:xfrm>
-      </p:grpSpPr>
-      <p:sp>
-        <p:nvSpPr>
-          <p:cNvPr id="2" name="Titre 1"/>
-          <p:cNvSpPr>
-            <a:spLocks noGrp="1"/>
-          </p:cNvSpPr>
-          <p:nvPr>
-            <p:ph type="title"/>
-          </p:nvPr>
-        </p:nvSpPr>
-        <p:spPr>
-          <a:xfrm>
-            <a:off x="4529050" y="267740"/>
-            <a:ext cx="3133899" cy="430529"/>
-          </a:xfrm>
-        </p:spPr>
-        <p:txBody>
-          <a:bodyPr>
-            <a:noAutofit/>
-          </a:bodyPr>
-          <a:lstStyle/>
-          <a:p>
-            <a:pPr algn="ctr"/>
-            <a:r>
-              <a:rPr lang="fr-FR" sz="3200" cap="none" spc="0" dirty="0"/>
-              <a:t>Services proposés</a:t>
-            </a:r>
-          </a:p>
-        </p:txBody>
-      </p:sp>
-      <p:sp>
-        <p:nvSpPr>
-          <p:cNvPr id="3" name="Espace réservé du contenu 2"/>
-          <p:cNvSpPr>
-            <a:spLocks noGrp="1"/>
-          </p:cNvSpPr>
-          <p:nvPr>
-            <p:ph idx="1"/>
-          </p:nvPr>
-        </p:nvSpPr>
-        <p:spPr>
-          <a:xfrm>
-            <a:off x="423949" y="861058"/>
-            <a:ext cx="10997738" cy="5729202"/>
-          </a:xfrm>
-        </p:spPr>
-        <p:txBody>
-          <a:bodyPr>
-            <a:noAutofit/>
-          </a:bodyPr>
-          <a:lstStyle/>
-          <a:p>
-            <a:r>
-              <a:rPr lang="fr-FR" sz="1800" b="1" dirty="0">
-                <a:solidFill>
-                  <a:srgbClr val="FF0000"/>
-                </a:solidFill>
-                <a:latin typeface="Segoe UI" panose="020B0502040204020203" pitchFamily="34" charset="0"/>
-                <a:cs typeface="Segoe UI" panose="020B0502040204020203" pitchFamily="34" charset="0"/>
-              </a:rPr>
-              <a:t>Utilisateur :</a:t>
-            </a:r>
-          </a:p>
-          <a:p>
-            <a:pPr lvl="1"/>
-            <a:r>
-              <a:rPr lang="fr-FR" dirty="0">
-                <a:solidFill>
-                  <a:schemeClr val="tx1"/>
-                </a:solidFill>
-                <a:latin typeface="Segoe UI" panose="020B0502040204020203" pitchFamily="34" charset="0"/>
-                <a:cs typeface="Segoe UI" panose="020B0502040204020203" pitchFamily="34" charset="0"/>
-              </a:rPr>
-              <a:t>	- </a:t>
-            </a:r>
-            <a:r>
-              <a:rPr lang="fr-FR" i="1" dirty="0">
-                <a:solidFill>
-                  <a:srgbClr val="00B050"/>
-                </a:solidFill>
-                <a:latin typeface="Segoe UI" panose="020B0502040204020203" pitchFamily="34" charset="0"/>
-                <a:cs typeface="Segoe UI" panose="020B0502040204020203" pitchFamily="34" charset="0"/>
-              </a:rPr>
-              <a:t>Partager</a:t>
-            </a:r>
-            <a:r>
-              <a:rPr lang="fr-FR" dirty="0">
-                <a:solidFill>
-                  <a:schemeClr val="tx1"/>
-                </a:solidFill>
-                <a:latin typeface="Segoe UI" panose="020B0502040204020203" pitchFamily="34" charset="0"/>
-                <a:cs typeface="Segoe UI" panose="020B0502040204020203" pitchFamily="34" charset="0"/>
-              </a:rPr>
-              <a:t> : publier des photos, les liant à un évènement automatiquement ou manuellement</a:t>
-            </a:r>
-          </a:p>
-          <a:p>
-            <a:pPr lvl="1"/>
-            <a:r>
-              <a:rPr lang="fr-FR" dirty="0">
-                <a:solidFill>
-                  <a:schemeClr val="tx1"/>
-                </a:solidFill>
-                <a:latin typeface="Segoe UI" panose="020B0502040204020203" pitchFamily="34" charset="0"/>
-                <a:cs typeface="Segoe UI" panose="020B0502040204020203" pitchFamily="34" charset="0"/>
-              </a:rPr>
-              <a:t>	- </a:t>
-            </a:r>
-            <a:r>
-              <a:rPr lang="fr-FR" i="1" dirty="0">
-                <a:solidFill>
-                  <a:srgbClr val="00B050"/>
-                </a:solidFill>
-                <a:latin typeface="Segoe UI" panose="020B0502040204020203" pitchFamily="34" charset="0"/>
-                <a:cs typeface="Segoe UI" panose="020B0502040204020203" pitchFamily="34" charset="0"/>
-              </a:rPr>
-              <a:t>Réagir</a:t>
-            </a:r>
-            <a:r>
-              <a:rPr lang="fr-FR" dirty="0">
-                <a:solidFill>
-                  <a:schemeClr val="tx1"/>
-                </a:solidFill>
-                <a:latin typeface="Segoe UI" panose="020B0502040204020203" pitchFamily="34" charset="0"/>
-                <a:cs typeface="Segoe UI" panose="020B0502040204020203" pitchFamily="34" charset="0"/>
-              </a:rPr>
-              <a:t> : aimer des publications ou les envoyer grâce à un lien</a:t>
-            </a:r>
-          </a:p>
-          <a:p>
-            <a:r>
-              <a:rPr lang="fr-FR" sz="1800" b="1" dirty="0">
-                <a:solidFill>
-                  <a:srgbClr val="FF0000"/>
-                </a:solidFill>
-                <a:latin typeface="Segoe UI" panose="020B0502040204020203" pitchFamily="34" charset="0"/>
-                <a:cs typeface="Segoe UI" panose="020B0502040204020203" pitchFamily="34" charset="0"/>
-              </a:rPr>
-              <a:t>Organisateur :</a:t>
-            </a:r>
-          </a:p>
-          <a:p>
-            <a:pPr marL="0" indent="0">
-              <a:buNone/>
-            </a:pPr>
-            <a:r>
-              <a:rPr lang="fr-FR" b="1" dirty="0">
-                <a:solidFill>
-                  <a:srgbClr val="FF0000"/>
-                </a:solidFill>
-                <a:latin typeface="Segoe UI" panose="020B0502040204020203" pitchFamily="34" charset="0"/>
-                <a:cs typeface="Segoe UI" panose="020B0502040204020203" pitchFamily="34" charset="0"/>
-              </a:rPr>
-              <a:t>	</a:t>
-            </a:r>
-            <a:r>
-              <a:rPr lang="fr-FR" dirty="0">
-                <a:solidFill>
-                  <a:schemeClr val="tx1"/>
-                </a:solidFill>
-                <a:latin typeface="Segoe UI" panose="020B0502040204020203" pitchFamily="34" charset="0"/>
-                <a:cs typeface="Segoe UI" panose="020B0502040204020203" pitchFamily="34" charset="0"/>
-              </a:rPr>
-              <a:t>- </a:t>
-            </a:r>
-            <a:r>
-              <a:rPr lang="fr-FR" i="1" dirty="0">
-                <a:solidFill>
-                  <a:srgbClr val="00B050"/>
-                </a:solidFill>
-                <a:latin typeface="Segoe UI" panose="020B0502040204020203" pitchFamily="34" charset="0"/>
-                <a:cs typeface="Segoe UI" panose="020B0502040204020203" pitchFamily="34" charset="0"/>
-              </a:rPr>
-              <a:t>Créer/Modifier/Supprimer</a:t>
-            </a:r>
-            <a:r>
-              <a:rPr lang="fr-FR" dirty="0">
-                <a:solidFill>
-                  <a:schemeClr val="tx1"/>
-                </a:solidFill>
-                <a:latin typeface="Segoe UI" panose="020B0502040204020203" pitchFamily="34" charset="0"/>
-                <a:cs typeface="Segoe UI" panose="020B0502040204020203" pitchFamily="34" charset="0"/>
-              </a:rPr>
-              <a:t> un évènement</a:t>
-            </a:r>
-          </a:p>
-          <a:p>
-            <a:pPr lvl="1"/>
-            <a:r>
-              <a:rPr lang="fr-FR" dirty="0">
-                <a:solidFill>
-                  <a:schemeClr val="tx1"/>
-                </a:solidFill>
-                <a:latin typeface="Segoe UI" panose="020B0502040204020203" pitchFamily="34" charset="0"/>
-                <a:cs typeface="Segoe UI" panose="020B0502040204020203" pitchFamily="34" charset="0"/>
-              </a:rPr>
-              <a:t>	-</a:t>
-            </a:r>
-            <a:r>
-              <a:rPr lang="fr-FR" dirty="0">
-                <a:solidFill>
-                  <a:srgbClr val="00B050"/>
-                </a:solidFill>
-                <a:latin typeface="Segoe UI" panose="020B0502040204020203" pitchFamily="34" charset="0"/>
-                <a:cs typeface="Segoe UI" panose="020B0502040204020203" pitchFamily="34" charset="0"/>
-              </a:rPr>
-              <a:t> </a:t>
-            </a:r>
-            <a:r>
-              <a:rPr lang="fr-FR" i="1" dirty="0">
-                <a:solidFill>
-                  <a:srgbClr val="00B050"/>
-                </a:solidFill>
-                <a:latin typeface="Segoe UI" panose="020B0502040204020203" pitchFamily="34" charset="0"/>
-                <a:cs typeface="Segoe UI" panose="020B0502040204020203" pitchFamily="34" charset="0"/>
-              </a:rPr>
-              <a:t>Créer/Modifier/Supprimer</a:t>
-            </a:r>
-            <a:r>
-              <a:rPr lang="fr-FR" dirty="0">
-                <a:solidFill>
-                  <a:schemeClr val="tx1"/>
-                </a:solidFill>
-                <a:latin typeface="Segoe UI" panose="020B0502040204020203" pitchFamily="34" charset="0"/>
-                <a:cs typeface="Segoe UI" panose="020B0502040204020203" pitchFamily="34" charset="0"/>
-              </a:rPr>
-              <a:t> un ou des salons textuels de l’évènement</a:t>
-            </a:r>
-          </a:p>
-          <a:p>
-            <a:pPr lvl="1"/>
-            <a:r>
-              <a:rPr lang="fr-FR" b="1" dirty="0">
-                <a:solidFill>
-                  <a:schemeClr val="tx1"/>
-                </a:solidFill>
-                <a:latin typeface="Segoe UI" panose="020B0502040204020203" pitchFamily="34" charset="0"/>
-                <a:cs typeface="Segoe UI" panose="020B0502040204020203" pitchFamily="34" charset="0"/>
-              </a:rPr>
-              <a:t>	</a:t>
-            </a:r>
-            <a:r>
-              <a:rPr lang="fr-FR" dirty="0">
-                <a:solidFill>
-                  <a:schemeClr val="tx1"/>
-                </a:solidFill>
-                <a:latin typeface="Segoe UI" panose="020B0502040204020203" pitchFamily="34" charset="0"/>
-                <a:cs typeface="Segoe UI" panose="020B0502040204020203" pitchFamily="34" charset="0"/>
-              </a:rPr>
-              <a:t>-</a:t>
-            </a:r>
-            <a:r>
-              <a:rPr lang="fr-FR" b="1" dirty="0">
-                <a:solidFill>
-                  <a:schemeClr val="tx1"/>
-                </a:solidFill>
-                <a:latin typeface="Segoe UI" panose="020B0502040204020203" pitchFamily="34" charset="0"/>
-                <a:cs typeface="Segoe UI" panose="020B0502040204020203" pitchFamily="34" charset="0"/>
-              </a:rPr>
-              <a:t> </a:t>
-            </a:r>
-            <a:r>
-              <a:rPr lang="fr-FR" i="1" dirty="0">
-                <a:solidFill>
-                  <a:srgbClr val="00B050"/>
-                </a:solidFill>
-                <a:latin typeface="Segoe UI" panose="020B0502040204020203" pitchFamily="34" charset="0"/>
-                <a:cs typeface="Segoe UI" panose="020B0502040204020203" pitchFamily="34" charset="0"/>
-              </a:rPr>
-              <a:t>Lire/Ecrire </a:t>
-            </a:r>
-            <a:r>
-              <a:rPr lang="fr-FR" i="1" dirty="0">
-                <a:solidFill>
-                  <a:schemeClr val="tx1"/>
-                </a:solidFill>
-                <a:latin typeface="Segoe UI" panose="020B0502040204020203" pitchFamily="34" charset="0"/>
-                <a:cs typeface="Segoe UI" panose="020B0502040204020203" pitchFamily="34" charset="0"/>
-              </a:rPr>
-              <a:t>dans </a:t>
-            </a:r>
-            <a:r>
-              <a:rPr lang="fr-FR" dirty="0">
-                <a:solidFill>
-                  <a:schemeClr val="tx1"/>
-                </a:solidFill>
-                <a:latin typeface="Segoe UI" panose="020B0502040204020203" pitchFamily="34" charset="0"/>
-                <a:cs typeface="Segoe UI" panose="020B0502040204020203" pitchFamily="34" charset="0"/>
-              </a:rPr>
-              <a:t>un ou des salons textuels lié à son l’évènement</a:t>
-            </a:r>
-          </a:p>
-          <a:p>
-            <a:pPr lvl="1"/>
-            <a:r>
-              <a:rPr lang="fr-FR" dirty="0">
-                <a:solidFill>
-                  <a:schemeClr val="tx1"/>
-                </a:solidFill>
-                <a:latin typeface="Segoe UI" panose="020B0502040204020203" pitchFamily="34" charset="0"/>
-                <a:cs typeface="Segoe UI" panose="020B0502040204020203" pitchFamily="34" charset="0"/>
-              </a:rPr>
-              <a:t>	- </a:t>
-            </a:r>
-            <a:r>
-              <a:rPr lang="fr-FR" i="1" dirty="0">
-                <a:solidFill>
-                  <a:srgbClr val="00B050"/>
-                </a:solidFill>
-                <a:latin typeface="Segoe UI" panose="020B0502040204020203" pitchFamily="34" charset="0"/>
-                <a:cs typeface="Segoe UI" panose="020B0502040204020203" pitchFamily="34" charset="0"/>
-              </a:rPr>
-              <a:t>Partager</a:t>
-            </a:r>
-            <a:r>
-              <a:rPr lang="fr-FR" dirty="0">
-                <a:solidFill>
-                  <a:schemeClr val="tx1"/>
-                </a:solidFill>
-                <a:latin typeface="Segoe UI" panose="020B0502040204020203" pitchFamily="34" charset="0"/>
-                <a:cs typeface="Segoe UI" panose="020B0502040204020203" pitchFamily="34" charset="0"/>
-              </a:rPr>
-              <a:t> du contenu multimédia</a:t>
-            </a:r>
-          </a:p>
-          <a:p>
-            <a:pPr lvl="1"/>
-            <a:r>
-              <a:rPr lang="fr-FR" dirty="0">
-                <a:solidFill>
-                  <a:schemeClr val="tx1"/>
-                </a:solidFill>
-                <a:latin typeface="Segoe UI" panose="020B0502040204020203" pitchFamily="34" charset="0"/>
-                <a:cs typeface="Segoe UI" panose="020B0502040204020203" pitchFamily="34" charset="0"/>
-              </a:rPr>
-              <a:t>	- </a:t>
-            </a:r>
-            <a:r>
-              <a:rPr lang="fr-FR" i="1" dirty="0">
-                <a:solidFill>
-                  <a:srgbClr val="00B050"/>
-                </a:solidFill>
-                <a:latin typeface="Segoe UI" panose="020B0502040204020203" pitchFamily="34" charset="0"/>
-                <a:cs typeface="Segoe UI" panose="020B0502040204020203" pitchFamily="34" charset="0"/>
-              </a:rPr>
-              <a:t>Gérer</a:t>
-            </a:r>
-            <a:r>
-              <a:rPr lang="fr-FR" dirty="0">
-                <a:solidFill>
-                  <a:schemeClr val="tx1"/>
-                </a:solidFill>
-                <a:latin typeface="Segoe UI" panose="020B0502040204020203" pitchFamily="34" charset="0"/>
-                <a:cs typeface="Segoe UI" panose="020B0502040204020203" pitchFamily="34" charset="0"/>
-              </a:rPr>
-              <a:t> son évènement</a:t>
-            </a:r>
-          </a:p>
-          <a:p>
-            <a:r>
-              <a:rPr lang="fr-FR" sz="1800" b="1" dirty="0">
-                <a:solidFill>
-                  <a:srgbClr val="FF0000"/>
-                </a:solidFill>
-                <a:latin typeface="Segoe UI" panose="020B0502040204020203" pitchFamily="34" charset="0"/>
-                <a:cs typeface="Segoe UI" panose="020B0502040204020203" pitchFamily="34" charset="0"/>
-              </a:rPr>
-              <a:t>Modérateur de l’application : </a:t>
-            </a:r>
-          </a:p>
-          <a:p>
-            <a:pPr marL="0" indent="0">
-              <a:buNone/>
-            </a:pPr>
-            <a:r>
-              <a:rPr lang="fr-FR" dirty="0">
-                <a:solidFill>
-                  <a:srgbClr val="FF0000"/>
-                </a:solidFill>
-                <a:latin typeface="Segoe UI" panose="020B0502040204020203" pitchFamily="34" charset="0"/>
-                <a:cs typeface="Segoe UI" panose="020B0502040204020203" pitchFamily="34" charset="0"/>
-              </a:rPr>
-              <a:t>	</a:t>
-            </a:r>
-            <a:r>
-              <a:rPr lang="fr-FR" dirty="0">
-                <a:solidFill>
-                  <a:schemeClr val="tx1"/>
-                </a:solidFill>
-                <a:latin typeface="Segoe UI" panose="020B0502040204020203" pitchFamily="34" charset="0"/>
-                <a:cs typeface="Segoe UI" panose="020B0502040204020203" pitchFamily="34" charset="0"/>
-              </a:rPr>
-              <a:t>- </a:t>
-            </a:r>
-            <a:r>
-              <a:rPr lang="fr-FR" i="1" dirty="0">
-                <a:solidFill>
-                  <a:srgbClr val="00B050"/>
-                </a:solidFill>
-                <a:latin typeface="Segoe UI" panose="020B0502040204020203" pitchFamily="34" charset="0"/>
-                <a:cs typeface="Segoe UI" panose="020B0502040204020203" pitchFamily="34" charset="0"/>
-              </a:rPr>
-              <a:t>Supprimer</a:t>
-            </a:r>
-            <a:r>
-              <a:rPr lang="fr-FR" dirty="0">
-                <a:solidFill>
-                  <a:schemeClr val="tx1"/>
-                </a:solidFill>
-                <a:latin typeface="Segoe UI" panose="020B0502040204020203" pitchFamily="34" charset="0"/>
-                <a:cs typeface="Segoe UI" panose="020B0502040204020203" pitchFamily="34" charset="0"/>
-              </a:rPr>
-              <a:t> du contenu indésirable</a:t>
-            </a:r>
-          </a:p>
-          <a:p>
-            <a:pPr lvl="1"/>
-            <a:r>
-              <a:rPr lang="fr-FR" dirty="0">
-                <a:solidFill>
-                  <a:schemeClr val="tx1"/>
-                </a:solidFill>
-                <a:latin typeface="Segoe UI" panose="020B0502040204020203" pitchFamily="34" charset="0"/>
-                <a:cs typeface="Segoe UI" panose="020B0502040204020203" pitchFamily="34" charset="0"/>
-              </a:rPr>
-              <a:t>	- </a:t>
-            </a:r>
-            <a:r>
-              <a:rPr lang="fr-FR" i="1" dirty="0">
-                <a:solidFill>
-                  <a:srgbClr val="00B050"/>
-                </a:solidFill>
-                <a:latin typeface="Segoe UI" panose="020B0502040204020203" pitchFamily="34" charset="0"/>
-                <a:cs typeface="Segoe UI" panose="020B0502040204020203" pitchFamily="34" charset="0"/>
-              </a:rPr>
-              <a:t>Bannir</a:t>
-            </a:r>
-            <a:r>
-              <a:rPr lang="fr-FR" dirty="0">
-                <a:solidFill>
-                  <a:schemeClr val="tx1"/>
-                </a:solidFill>
-                <a:latin typeface="Segoe UI" panose="020B0502040204020203" pitchFamily="34" charset="0"/>
-                <a:cs typeface="Segoe UI" panose="020B0502040204020203" pitchFamily="34" charset="0"/>
-              </a:rPr>
-              <a:t> un utilisateur</a:t>
-            </a:r>
-          </a:p>
-        </p:txBody>
-      </p:sp>
-      <p:sp>
-        <p:nvSpPr>
-          <p:cNvPr id="5" name="ZoneTexte 4">
-            <a:extLst>
-              <a:ext uri="{FF2B5EF4-FFF2-40B4-BE49-F238E27FC236}">
-                <a16:creationId xmlns:a16="http://schemas.microsoft.com/office/drawing/2014/main" id="{3319E3B9-88C3-4492-9F21-118FEF8E3496}"/>
-              </a:ext>
-            </a:extLst>
-          </p:cNvPr>
-          <p:cNvSpPr txBox="1"/>
-          <p:nvPr/>
-        </p:nvSpPr>
-        <p:spPr>
-          <a:xfrm>
-            <a:off x="11558493" y="6488668"/>
-            <a:ext cx="633507" cy="369332"/>
-          </a:xfrm>
-          <a:prstGeom prst="rect">
-            <a:avLst/>
-          </a:prstGeom>
-          <a:noFill/>
-        </p:spPr>
-        <p:txBody>
-          <a:bodyPr wrap="none" rtlCol="0">
-            <a:spAutoFit/>
-          </a:bodyPr>
-          <a:lstStyle/>
-          <a:p>
-            <a:r>
-              <a:rPr lang="fr-FR" dirty="0">
-                <a:solidFill>
-                  <a:schemeClr val="tx1">
-                    <a:lumMod val="85000"/>
-                    <a:lumOff val="15000"/>
-                  </a:schemeClr>
-                </a:solidFill>
-                <a:latin typeface="Liberation Sans" panose="020B0604020202020204" pitchFamily="34" charset="0"/>
-                <a:ea typeface="Liberation Sans" panose="020B0604020202020204" pitchFamily="34" charset="0"/>
-                <a:cs typeface="Liberation Sans" panose="020B0604020202020204" pitchFamily="34" charset="0"/>
-              </a:rPr>
-              <a:t>4 / 8</a:t>
-            </a:r>
-          </a:p>
-        </p:txBody>
-      </p:sp>
-    </p:spTree>
-    <p:extLst>
-      <p:ext uri="{BB962C8B-B14F-4D97-AF65-F5344CB8AC3E}">
-        <p14:creationId xmlns:p14="http://schemas.microsoft.com/office/powerpoint/2010/main" val="354700759"/>
-      </p:ext>
-    </p:extLst>
-  </p:cSld>
-  <p:clrMapOvr>
-    <a:masterClrMapping/>
-  </p:clrMapOvr>
-</p:sld>
-</file>
-
-<file path=ppt/slides/slide5.xml><?xml version="1.0" encoding="utf-8"?>
 <p:sld xmlns:a="http://schemas.openxmlformats.org/drawingml/2006/main" xmlns:r="http://schemas.openxmlformats.org/officeDocument/2006/relationships" xmlns:p="http://schemas.openxmlformats.org/presentationml/2006/main">
   <p:cSld>
     <p:spTree>
@@ -6822,7 +6159,7 @@
                 <a:ea typeface="Liberation Sans" panose="020B0604020202020204" pitchFamily="34" charset="0"/>
                 <a:cs typeface="Liberation Sans" panose="020B0604020202020204" pitchFamily="34" charset="0"/>
               </a:rPr>
-              <a:t>5 / 8</a:t>
+              <a:t>4 / 7</a:t>
             </a:r>
           </a:p>
         </p:txBody>
@@ -6936,7 +6273,7 @@
         </p:spPr>
         <p:txBody>
           <a:bodyPr vert="horz" lIns="91440" tIns="45720" rIns="91440" bIns="45720" rtlCol="0" anchor="ctr">
-            <a:normAutofit fontScale="92500" lnSpcReduction="10000"/>
+            <a:noAutofit/>
           </a:bodyPr>
           <a:lstStyle>
             <a:lvl1pPr algn="l" defTabSz="914400" rtl="0" eaLnBrk="1" latinLnBrk="0" hangingPunct="1">
@@ -6962,7 +6299,7 @@
           </a:lstStyle>
           <a:p>
             <a:r>
-              <a:rPr lang="fr-FR" sz="3600" cap="none" spc="0" dirty="0"/>
+              <a:rPr lang="fr-FR" sz="3300" cap="none" spc="0" dirty="0"/>
               <a:t>Diagramme des cas d’utilisation :</a:t>
             </a:r>
           </a:p>
@@ -7035,6 +6372,206 @@
 </p:sld>
 </file>
 
+<file path=ppt/slides/slide5.xml><?xml version="1.0" encoding="utf-8"?>
+<p:sld xmlns:a="http://schemas.openxmlformats.org/drawingml/2006/main" xmlns:r="http://schemas.openxmlformats.org/officeDocument/2006/relationships" xmlns:p="http://schemas.openxmlformats.org/presentationml/2006/main">
+  <p:cSld>
+    <p:spTree>
+      <p:nvGrpSpPr>
+        <p:cNvPr id="1" name=""/>
+        <p:cNvGrpSpPr/>
+        <p:nvPr/>
+      </p:nvGrpSpPr>
+      <p:grpSpPr>
+        <a:xfrm>
+          <a:off x="0" y="0"/>
+          <a:ext cx="0" cy="0"/>
+          <a:chOff x="0" y="0"/>
+          <a:chExt cx="0" cy="0"/>
+        </a:xfrm>
+      </p:grpSpPr>
+      <p:sp>
+        <p:nvSpPr>
+          <p:cNvPr id="2" name="Titre 1">
+            <a:extLst>
+              <a:ext uri="{FF2B5EF4-FFF2-40B4-BE49-F238E27FC236}">
+                <a16:creationId xmlns:a16="http://schemas.microsoft.com/office/drawing/2014/main" id="{6905F23D-AB2E-4016-81A2-C83CE91B2F30}"/>
+              </a:ext>
+            </a:extLst>
+          </p:cNvPr>
+          <p:cNvSpPr>
+            <a:spLocks noGrp="1"/>
+          </p:cNvSpPr>
+          <p:nvPr>
+            <p:ph type="title"/>
+          </p:nvPr>
+        </p:nvSpPr>
+        <p:spPr/>
+        <p:txBody>
+          <a:bodyPr/>
+          <a:lstStyle/>
+          <a:p>
+            <a:r>
+              <a:rPr lang="fr-FR" dirty="0"/>
+              <a:t>Développement</a:t>
+            </a:r>
+          </a:p>
+        </p:txBody>
+      </p:sp>
+      <p:sp>
+        <p:nvSpPr>
+          <p:cNvPr id="3" name="Espace réservé du contenu 2">
+            <a:extLst>
+              <a:ext uri="{FF2B5EF4-FFF2-40B4-BE49-F238E27FC236}">
+                <a16:creationId xmlns:a16="http://schemas.microsoft.com/office/drawing/2014/main" id="{1FF6BE3F-25B8-442C-885E-DD617EDB98D9}"/>
+              </a:ext>
+            </a:extLst>
+          </p:cNvPr>
+          <p:cNvSpPr>
+            <a:spLocks noGrp="1"/>
+          </p:cNvSpPr>
+          <p:nvPr>
+            <p:ph idx="1"/>
+          </p:nvPr>
+        </p:nvSpPr>
+        <p:spPr>
+          <a:xfrm>
+            <a:off x="1050879" y="1825624"/>
+            <a:ext cx="9810604" cy="4663044"/>
+          </a:xfrm>
+        </p:spPr>
+        <p:txBody>
+          <a:bodyPr>
+            <a:normAutofit/>
+          </a:bodyPr>
+          <a:lstStyle/>
+          <a:p>
+            <a:r>
+              <a:rPr lang="fr-FR" dirty="0"/>
+              <a:t>Public cible : Les </a:t>
+            </a:r>
+            <a:r>
+              <a:rPr lang="fr-FR" i="1" dirty="0"/>
+              <a:t>Digital natives </a:t>
+            </a:r>
+            <a:r>
+              <a:rPr lang="fr-FR" dirty="0"/>
+              <a:t>(nés après 1980), et les plus de 13 ans, principalement intéressés par les évènements (festivals, conventions…). Pas de compétences avancées requises.</a:t>
+            </a:r>
+          </a:p>
+          <a:p>
+            <a:r>
+              <a:rPr lang="fr-FR" dirty="0"/>
+              <a:t>Type d’application : Web Responsive</a:t>
+            </a:r>
+          </a:p>
+          <a:p>
+            <a:r>
+              <a:rPr lang="fr-FR" dirty="0"/>
+              <a:t>Langages et outils de développement : </a:t>
+            </a:r>
+          </a:p>
+          <a:p>
+            <a:pPr lvl="1"/>
+            <a:r>
+              <a:rPr lang="fr-FR" dirty="0"/>
+              <a:t>	- SQL, HTML/CSS et éventuellement JavaScript et/ou PHP</a:t>
+            </a:r>
+          </a:p>
+          <a:p>
+            <a:pPr lvl="1"/>
+            <a:r>
+              <a:rPr lang="fr-FR" dirty="0"/>
+              <a:t>	- Serveur web</a:t>
+            </a:r>
+          </a:p>
+          <a:p>
+            <a:r>
+              <a:rPr lang="fr-FR" dirty="0"/>
+              <a:t>Outils de gestion de projet :</a:t>
+            </a:r>
+          </a:p>
+          <a:p>
+            <a:pPr lvl="1"/>
+            <a:r>
+              <a:rPr lang="fr-FR" dirty="0"/>
+              <a:t>	- Partage des fichiers : Git</a:t>
+            </a:r>
+          </a:p>
+          <a:p>
+            <a:pPr lvl="1"/>
+            <a:r>
+              <a:rPr lang="fr-FR" dirty="0"/>
+              <a:t>	- Pour une collaboration en ligne : Git, Google Docs</a:t>
+            </a:r>
+          </a:p>
+          <a:p>
+            <a:pPr lvl="1"/>
+            <a:r>
+              <a:rPr lang="fr-FR" dirty="0"/>
+              <a:t> 	- Échanges : Discord, Mails</a:t>
+            </a:r>
+          </a:p>
+          <a:p>
+            <a:pPr lvl="1"/>
+            <a:r>
+              <a:rPr lang="fr-FR" dirty="0"/>
+              <a:t>	- Planification : Excel</a:t>
+            </a:r>
+          </a:p>
+        </p:txBody>
+      </p:sp>
+      <p:sp>
+        <p:nvSpPr>
+          <p:cNvPr id="4" name="ZoneTexte 3">
+            <a:extLst>
+              <a:ext uri="{FF2B5EF4-FFF2-40B4-BE49-F238E27FC236}">
+                <a16:creationId xmlns:a16="http://schemas.microsoft.com/office/drawing/2014/main" id="{930383B1-E332-4C5C-BCBE-525A7C493A03}"/>
+              </a:ext>
+            </a:extLst>
+          </p:cNvPr>
+          <p:cNvSpPr txBox="1"/>
+          <p:nvPr/>
+        </p:nvSpPr>
+        <p:spPr>
+          <a:xfrm>
+            <a:off x="11558493" y="6488668"/>
+            <a:ext cx="633507" cy="369332"/>
+          </a:xfrm>
+          <a:prstGeom prst="rect">
+            <a:avLst/>
+          </a:prstGeom>
+          <a:noFill/>
+        </p:spPr>
+        <p:txBody>
+          <a:bodyPr wrap="none" rtlCol="0">
+            <a:spAutoFit/>
+          </a:bodyPr>
+          <a:lstStyle/>
+          <a:p>
+            <a:r>
+              <a:rPr lang="fr-FR" dirty="0">
+                <a:latin typeface="Liberation Sans" panose="020B0604020202020204" pitchFamily="34" charset="0"/>
+                <a:ea typeface="Liberation Sans" panose="020B0604020202020204" pitchFamily="34" charset="0"/>
+                <a:cs typeface="Liberation Sans" panose="020B0604020202020204" pitchFamily="34" charset="0"/>
+              </a:rPr>
+              <a:t>5 / 7</a:t>
+            </a:r>
+          </a:p>
+        </p:txBody>
+      </p:sp>
+    </p:spTree>
+    <p:extLst>
+      <p:ext uri="{BB962C8B-B14F-4D97-AF65-F5344CB8AC3E}">
+        <p14:creationId xmlns:p14="http://schemas.microsoft.com/office/powerpoint/2010/main" val="2471766703"/>
+      </p:ext>
+    </p:extLst>
+  </p:cSld>
+  <p:clrMapOvr>
+    <a:masterClrMapping/>
+  </p:clrMapOvr>
+</p:sld>
+</file>
+
 <file path=ppt/slides/slide6.xml><?xml version="1.0" encoding="utf-8"?>
 <p:sld xmlns:a="http://schemas.openxmlformats.org/drawingml/2006/main" xmlns:r="http://schemas.openxmlformats.org/officeDocument/2006/relationships" xmlns:p="http://schemas.openxmlformats.org/presentationml/2006/main">
   <p:cSld>
@@ -7052,6 +6589,53 @@
           <a:chExt cx="0" cy="0"/>
         </a:xfrm>
       </p:grpSpPr>
+      <p:pic>
+        <p:nvPicPr>
+          <p:cNvPr id="1026" name="Picture 2" descr="Image">
+            <a:extLst>
+              <a:ext uri="{FF2B5EF4-FFF2-40B4-BE49-F238E27FC236}">
+                <a16:creationId xmlns:a16="http://schemas.microsoft.com/office/drawing/2014/main" id="{59D701AD-3DDB-43E8-AF40-A054C6EC7BC8}"/>
+              </a:ext>
+            </a:extLst>
+          </p:cNvPr>
+          <p:cNvPicPr>
+            <a:picLocks noChangeAspect="1" noChangeArrowheads="1"/>
+          </p:cNvPicPr>
+          <p:nvPr/>
+        </p:nvPicPr>
+        <p:blipFill>
+          <a:blip r:embed="rId2">
+            <a:extLst>
+              <a:ext uri="{28A0092B-C50C-407E-A947-70E740481C1C}">
+                <a14:useLocalDpi xmlns:a14="http://schemas.microsoft.com/office/drawing/2010/main" val="0"/>
+              </a:ext>
+            </a:extLst>
+          </a:blip>
+          <a:srcRect/>
+          <a:stretch>
+            <a:fillRect/>
+          </a:stretch>
+        </p:blipFill>
+        <p:spPr bwMode="auto">
+          <a:xfrm>
+            <a:off x="0" y="243636"/>
+            <a:ext cx="5943600" cy="1819275"/>
+          </a:xfrm>
+          <a:prstGeom prst="rect">
+            <a:avLst/>
+          </a:prstGeom>
+          <a:noFill/>
+          <a:extLst>
+            <a:ext uri="{909E8E84-426E-40DD-AFC4-6F175D3DCCD1}">
+              <a14:hiddenFill xmlns:a14="http://schemas.microsoft.com/office/drawing/2010/main">
+                <a:solidFill>
+                  <a:srgbClr val="FFFFFF"/>
+                </a:solidFill>
+              </a14:hiddenFill>
+            </a:ext>
+          </a:extLst>
+        </p:spPr>
+      </p:pic>
       <p:sp>
         <p:nvSpPr>
           <p:cNvPr id="2" name="Titre 1">
@@ -7068,117 +6652,22 @@
             <p:ph type="title"/>
           </p:nvPr>
         </p:nvSpPr>
-        <p:spPr/>
-        <p:txBody>
-          <a:bodyPr/>
-          <a:lstStyle/>
-          <a:p>
-            <a:r>
-              <a:rPr lang="fr-FR" dirty="0"/>
-              <a:t>Développement</a:t>
-            </a:r>
-          </a:p>
-        </p:txBody>
-      </p:sp>
-      <p:sp>
-        <p:nvSpPr>
-          <p:cNvPr id="3" name="Espace réservé du contenu 2">
-            <a:extLst>
-              <a:ext uri="{FF2B5EF4-FFF2-40B4-BE49-F238E27FC236}">
-                <a16:creationId xmlns:a16="http://schemas.microsoft.com/office/drawing/2014/main" id="{1FF6BE3F-25B8-442C-885E-DD617EDB98D9}"/>
-              </a:ext>
-            </a:extLst>
-          </p:cNvPr>
-          <p:cNvSpPr>
-            <a:spLocks noGrp="1"/>
-          </p:cNvSpPr>
-          <p:nvPr>
-            <p:ph idx="1"/>
-          </p:nvPr>
-        </p:nvSpPr>
         <p:spPr>
           <a:xfrm>
-            <a:off x="1050879" y="1825624"/>
-            <a:ext cx="9810604" cy="4663044"/>
+            <a:off x="0" y="0"/>
+            <a:ext cx="5657492" cy="487273"/>
           </a:xfrm>
         </p:spPr>
         <p:txBody>
           <a:bodyPr>
-            <a:normAutofit/>
+            <a:normAutofit fontScale="90000"/>
           </a:bodyPr>
           <a:lstStyle/>
           <a:p>
-            <a:r>
-              <a:rPr lang="fr-FR" dirty="0"/>
-              <a:t>Public cible : Les </a:t>
-            </a:r>
-            <a:r>
-              <a:rPr lang="fr-FR" i="1" dirty="0"/>
-              <a:t>Digital natives </a:t>
-            </a:r>
-            <a:r>
-              <a:rPr lang="fr-FR" dirty="0"/>
-              <a:t>(nés après 1980), et les plus de 13 ans, principalement intéressés par les évènements (festivals, conventions…). Pas de compétences avancées requises.</a:t>
-            </a:r>
-          </a:p>
-          <a:p>
-            <a:r>
-              <a:rPr lang="fr-FR" dirty="0"/>
-              <a:t>Type d’application : Web Responsive</a:t>
-            </a:r>
-          </a:p>
-          <a:p>
-            <a:r>
-              <a:rPr lang="fr-FR" dirty="0"/>
-              <a:t>Langages et outils de développement : </a:t>
-            </a:r>
-          </a:p>
-          <a:p>
-            <a:pPr lvl="1"/>
-            <a:r>
-              <a:rPr lang="fr-FR" dirty="0"/>
-              <a:t>	- SQL, HTML/CSS et éventuellement JavaScript et/ou PHP</a:t>
-            </a:r>
-          </a:p>
-          <a:p>
-            <a:pPr lvl="1"/>
-            <a:r>
-              <a:rPr lang="fr-FR" dirty="0"/>
-              <a:t>	- Serveur web</a:t>
-            </a:r>
-          </a:p>
-          <a:p>
-            <a:r>
-              <a:rPr lang="fr-FR" dirty="0"/>
-              <a:t>Outils de gestion de projet :</a:t>
-            </a:r>
-          </a:p>
-          <a:p>
-            <a:pPr lvl="1"/>
-            <a:r>
-              <a:rPr lang="fr-FR" dirty="0"/>
-              <a:t>	- Partage des fichiers : Git</a:t>
-            </a:r>
-          </a:p>
-          <a:p>
-            <a:pPr lvl="1"/>
-            <a:r>
-              <a:rPr lang="fr-FR" dirty="0"/>
-              <a:t>	- Pour une collaboration en ligne : Git, Google Docs</a:t>
-            </a:r>
-          </a:p>
-          <a:p>
-            <a:pPr lvl="1"/>
-            <a:r>
-              <a:rPr lang="fr-FR" dirty="0"/>
-              <a:t> 	- Échanges : Discord, Mails</a:t>
-            </a:r>
-          </a:p>
-          <a:p>
-            <a:pPr lvl="1"/>
-            <a:r>
-              <a:rPr lang="fr-FR" dirty="0"/>
-              <a:t>	- Planification : Excel</a:t>
+            <a:pPr algn="ctr"/>
+            <a:r>
+              <a:rPr lang="fr-FR" sz="3300" cap="none" spc="0" dirty="0"/>
+              <a:t>WBS (Work Breakdown Structure):</a:t>
             </a:r>
           </a:p>
         </p:txBody>
@@ -7197,8 +6686,8 @@
         </p:nvSpPr>
         <p:spPr>
           <a:xfrm>
-            <a:off x="11558493" y="6488668"/>
-            <a:ext cx="633507" cy="369332"/>
+            <a:off x="11587941" y="6483927"/>
+            <a:ext cx="695499" cy="374073"/>
           </a:xfrm>
           <a:prstGeom prst="rect">
             <a:avLst/>
@@ -7206,7 +6695,7 @@
           <a:noFill/>
         </p:spPr>
         <p:txBody>
-          <a:bodyPr wrap="none" rtlCol="0">
+          <a:bodyPr wrap="square" rtlCol="0">
             <a:spAutoFit/>
           </a:bodyPr>
           <a:lstStyle/>
@@ -7217,15 +6706,580 @@
                 <a:ea typeface="Liberation Sans" panose="020B0604020202020204" pitchFamily="34" charset="0"/>
                 <a:cs typeface="Liberation Sans" panose="020B0604020202020204" pitchFamily="34" charset="0"/>
               </a:rPr>
-              <a:t>6 / 8</a:t>
-            </a:r>
-          </a:p>
-        </p:txBody>
-      </p:sp>
+              <a:t>6 / 7</a:t>
+            </a:r>
+          </a:p>
+        </p:txBody>
+      </p:sp>
+      <p:pic>
+        <p:nvPicPr>
+          <p:cNvPr id="1028" name="Picture 4" descr="Image">
+            <a:extLst>
+              <a:ext uri="{FF2B5EF4-FFF2-40B4-BE49-F238E27FC236}">
+                <a16:creationId xmlns:a16="http://schemas.microsoft.com/office/drawing/2014/main" id="{6AA039BE-69C7-4614-BF41-656D8833C015}"/>
+              </a:ext>
+            </a:extLst>
+          </p:cNvPr>
+          <p:cNvPicPr>
+            <a:picLocks noChangeAspect="1" noChangeArrowheads="1"/>
+          </p:cNvPicPr>
+          <p:nvPr/>
+        </p:nvPicPr>
+        <p:blipFill>
+          <a:blip r:embed="rId3">
+            <a:extLst>
+              <a:ext uri="{28A0092B-C50C-407E-A947-70E740481C1C}">
+                <a14:useLocalDpi xmlns:a14="http://schemas.microsoft.com/office/drawing/2010/main" val="0"/>
+              </a:ext>
+            </a:extLst>
+          </a:blip>
+          <a:srcRect/>
+          <a:stretch>
+            <a:fillRect/>
+          </a:stretch>
+        </p:blipFill>
+        <p:spPr bwMode="auto">
+          <a:xfrm>
+            <a:off x="0" y="2153741"/>
+            <a:ext cx="6248400" cy="1473810"/>
+          </a:xfrm>
+          <a:prstGeom prst="rect">
+            <a:avLst/>
+          </a:prstGeom>
+          <a:noFill/>
+          <a:extLst>
+            <a:ext uri="{909E8E84-426E-40DD-AFC4-6F175D3DCCD1}">
+              <a14:hiddenFill xmlns:a14="http://schemas.microsoft.com/office/drawing/2010/main">
+                <a:solidFill>
+                  <a:srgbClr val="FFFFFF"/>
+                </a:solidFill>
+              </a14:hiddenFill>
+            </a:ext>
+          </a:extLst>
+        </p:spPr>
+      </p:pic>
+      <p:pic>
+        <p:nvPicPr>
+          <p:cNvPr id="1030" name="Picture 6" descr="Image">
+            <a:extLst>
+              <a:ext uri="{FF2B5EF4-FFF2-40B4-BE49-F238E27FC236}">
+                <a16:creationId xmlns:a16="http://schemas.microsoft.com/office/drawing/2014/main" id="{54816418-5AAF-47E8-B42C-F01CEA8AAF58}"/>
+              </a:ext>
+            </a:extLst>
+          </p:cNvPr>
+          <p:cNvPicPr>
+            <a:picLocks noChangeAspect="1" noChangeArrowheads="1"/>
+          </p:cNvPicPr>
+          <p:nvPr/>
+        </p:nvPicPr>
+        <p:blipFill>
+          <a:blip r:embed="rId4">
+            <a:extLst>
+              <a:ext uri="{28A0092B-C50C-407E-A947-70E740481C1C}">
+                <a14:useLocalDpi xmlns:a14="http://schemas.microsoft.com/office/drawing/2010/main" val="0"/>
+              </a:ext>
+            </a:extLst>
+          </a:blip>
+          <a:srcRect/>
+          <a:stretch>
+            <a:fillRect/>
+          </a:stretch>
+        </p:blipFill>
+        <p:spPr bwMode="auto">
+          <a:xfrm>
+            <a:off x="6248401" y="274427"/>
+            <a:ext cx="3714579" cy="1631020"/>
+          </a:xfrm>
+          <a:prstGeom prst="rect">
+            <a:avLst/>
+          </a:prstGeom>
+          <a:noFill/>
+          <a:extLst>
+            <a:ext uri="{909E8E84-426E-40DD-AFC4-6F175D3DCCD1}">
+              <a14:hiddenFill xmlns:a14="http://schemas.microsoft.com/office/drawing/2010/main">
+                <a:solidFill>
+                  <a:srgbClr val="FFFFFF"/>
+                </a:solidFill>
+              </a14:hiddenFill>
+            </a:ext>
+          </a:extLst>
+        </p:spPr>
+      </p:pic>
+      <p:pic>
+        <p:nvPicPr>
+          <p:cNvPr id="1032" name="Picture 8" descr="Image">
+            <a:extLst>
+              <a:ext uri="{FF2B5EF4-FFF2-40B4-BE49-F238E27FC236}">
+                <a16:creationId xmlns:a16="http://schemas.microsoft.com/office/drawing/2014/main" id="{4B60BD72-2F7D-470E-B69F-EA47C7B0A2E3}"/>
+              </a:ext>
+            </a:extLst>
+          </p:cNvPr>
+          <p:cNvPicPr>
+            <a:picLocks noChangeAspect="1" noChangeArrowheads="1"/>
+          </p:cNvPicPr>
+          <p:nvPr/>
+        </p:nvPicPr>
+        <p:blipFill>
+          <a:blip r:embed="rId5">
+            <a:extLst>
+              <a:ext uri="{28A0092B-C50C-407E-A947-70E740481C1C}">
+                <a14:useLocalDpi xmlns:a14="http://schemas.microsoft.com/office/drawing/2010/main" val="0"/>
+              </a:ext>
+            </a:extLst>
+          </a:blip>
+          <a:srcRect/>
+          <a:stretch>
+            <a:fillRect/>
+          </a:stretch>
+        </p:blipFill>
+        <p:spPr bwMode="auto">
+          <a:xfrm>
+            <a:off x="0" y="3627554"/>
+            <a:ext cx="7431578" cy="1569677"/>
+          </a:xfrm>
+          <a:prstGeom prst="rect">
+            <a:avLst/>
+          </a:prstGeom>
+          <a:noFill/>
+          <a:extLst>
+            <a:ext uri="{909E8E84-426E-40DD-AFC4-6F175D3DCCD1}">
+              <a14:hiddenFill xmlns:a14="http://schemas.microsoft.com/office/drawing/2010/main">
+                <a:solidFill>
+                  <a:srgbClr val="FFFFFF"/>
+                </a:solidFill>
+              </a14:hiddenFill>
+            </a:ext>
+          </a:extLst>
+        </p:spPr>
+      </p:pic>
+      <p:pic>
+        <p:nvPicPr>
+          <p:cNvPr id="1036" name="Picture 12" descr="Image">
+            <a:extLst>
+              <a:ext uri="{FF2B5EF4-FFF2-40B4-BE49-F238E27FC236}">
+                <a16:creationId xmlns:a16="http://schemas.microsoft.com/office/drawing/2014/main" id="{BA3A5DA3-16C2-4C74-98A6-75F5A5A4F7D0}"/>
+              </a:ext>
+            </a:extLst>
+          </p:cNvPr>
+          <p:cNvPicPr>
+            <a:picLocks noChangeAspect="1" noChangeArrowheads="1"/>
+          </p:cNvPicPr>
+          <p:nvPr/>
+        </p:nvPicPr>
+        <p:blipFill>
+          <a:blip r:embed="rId6">
+            <a:extLst>
+              <a:ext uri="{28A0092B-C50C-407E-A947-70E740481C1C}">
+                <a14:useLocalDpi xmlns:a14="http://schemas.microsoft.com/office/drawing/2010/main" val="0"/>
+              </a:ext>
+            </a:extLst>
+          </a:blip>
+          <a:srcRect/>
+          <a:stretch>
+            <a:fillRect/>
+          </a:stretch>
+        </p:blipFill>
+        <p:spPr bwMode="auto">
+          <a:xfrm>
+            <a:off x="7510809" y="2183833"/>
+            <a:ext cx="3875983" cy="2252054"/>
+          </a:xfrm>
+          <a:prstGeom prst="rect">
+            <a:avLst/>
+          </a:prstGeom>
+          <a:noFill/>
+          <a:extLst>
+            <a:ext uri="{909E8E84-426E-40DD-AFC4-6F175D3DCCD1}">
+              <a14:hiddenFill xmlns:a14="http://schemas.microsoft.com/office/drawing/2010/main">
+                <a:solidFill>
+                  <a:srgbClr val="FFFFFF"/>
+                </a:solidFill>
+              </a14:hiddenFill>
+            </a:ext>
+          </a:extLst>
+        </p:spPr>
+      </p:pic>
+      <p:pic>
+        <p:nvPicPr>
+          <p:cNvPr id="1038" name="Picture 14" descr="Image">
+            <a:extLst>
+              <a:ext uri="{FF2B5EF4-FFF2-40B4-BE49-F238E27FC236}">
+                <a16:creationId xmlns:a16="http://schemas.microsoft.com/office/drawing/2014/main" id="{A95041EC-D18F-4987-A0E5-87801D952544}"/>
+              </a:ext>
+            </a:extLst>
+          </p:cNvPr>
+          <p:cNvPicPr>
+            <a:picLocks noChangeAspect="1" noChangeArrowheads="1"/>
+          </p:cNvPicPr>
+          <p:nvPr/>
+        </p:nvPicPr>
+        <p:blipFill>
+          <a:blip r:embed="rId7">
+            <a:extLst>
+              <a:ext uri="{28A0092B-C50C-407E-A947-70E740481C1C}">
+                <a14:useLocalDpi xmlns:a14="http://schemas.microsoft.com/office/drawing/2010/main" val="0"/>
+              </a:ext>
+            </a:extLst>
+          </a:blip>
+          <a:srcRect/>
+          <a:stretch>
+            <a:fillRect/>
+          </a:stretch>
+        </p:blipFill>
+        <p:spPr bwMode="auto">
+          <a:xfrm>
+            <a:off x="200632" y="5261784"/>
+            <a:ext cx="6753225" cy="1504950"/>
+          </a:xfrm>
+          <a:prstGeom prst="rect">
+            <a:avLst/>
+          </a:prstGeom>
+          <a:noFill/>
+          <a:extLst>
+            <a:ext uri="{909E8E84-426E-40DD-AFC4-6F175D3DCCD1}">
+              <a14:hiddenFill xmlns:a14="http://schemas.microsoft.com/office/drawing/2010/main">
+                <a:solidFill>
+                  <a:srgbClr val="FFFFFF"/>
+                </a:solidFill>
+              </a14:hiddenFill>
+            </a:ext>
+          </a:extLst>
+        </p:spPr>
+      </p:pic>
+      <p:cxnSp>
+        <p:nvCxnSpPr>
+          <p:cNvPr id="8" name="Connecteur droit 7">
+            <a:extLst>
+              <a:ext uri="{FF2B5EF4-FFF2-40B4-BE49-F238E27FC236}">
+                <a16:creationId xmlns:a16="http://schemas.microsoft.com/office/drawing/2014/main" id="{2F40BC30-CA2F-47C6-B00B-22E9FF719656}"/>
+              </a:ext>
+            </a:extLst>
+          </p:cNvPr>
+          <p:cNvCxnSpPr/>
+          <p:nvPr/>
+        </p:nvCxnSpPr>
+        <p:spPr>
+          <a:xfrm>
+            <a:off x="0" y="2153741"/>
+            <a:ext cx="6248401" cy="0"/>
+          </a:xfrm>
+          <a:prstGeom prst="line">
+            <a:avLst/>
+          </a:prstGeom>
+        </p:spPr>
+        <p:style>
+          <a:lnRef idx="1">
+            <a:schemeClr val="accent1"/>
+          </a:lnRef>
+          <a:fillRef idx="0">
+            <a:schemeClr val="accent1"/>
+          </a:fillRef>
+          <a:effectRef idx="0">
+            <a:schemeClr val="accent1"/>
+          </a:effectRef>
+          <a:fontRef idx="minor">
+            <a:schemeClr val="tx1"/>
+          </a:fontRef>
+        </p:style>
+      </p:cxnSp>
+      <p:cxnSp>
+        <p:nvCxnSpPr>
+          <p:cNvPr id="11" name="Connecteur droit 10">
+            <a:extLst>
+              <a:ext uri="{FF2B5EF4-FFF2-40B4-BE49-F238E27FC236}">
+                <a16:creationId xmlns:a16="http://schemas.microsoft.com/office/drawing/2014/main" id="{7FB029B5-E094-466A-856C-D3065E0DD6BE}"/>
+              </a:ext>
+            </a:extLst>
+          </p:cNvPr>
+          <p:cNvCxnSpPr/>
+          <p:nvPr/>
+        </p:nvCxnSpPr>
+        <p:spPr>
+          <a:xfrm flipV="1">
+            <a:off x="6248401" y="0"/>
+            <a:ext cx="0" cy="2153741"/>
+          </a:xfrm>
+          <a:prstGeom prst="line">
+            <a:avLst/>
+          </a:prstGeom>
+        </p:spPr>
+        <p:style>
+          <a:lnRef idx="1">
+            <a:schemeClr val="accent1"/>
+          </a:lnRef>
+          <a:fillRef idx="0">
+            <a:schemeClr val="accent1"/>
+          </a:fillRef>
+          <a:effectRef idx="0">
+            <a:schemeClr val="accent1"/>
+          </a:effectRef>
+          <a:fontRef idx="minor">
+            <a:schemeClr val="tx1"/>
+          </a:fontRef>
+        </p:style>
+      </p:cxnSp>
+      <p:cxnSp>
+        <p:nvCxnSpPr>
+          <p:cNvPr id="13" name="Connecteur droit 12">
+            <a:extLst>
+              <a:ext uri="{FF2B5EF4-FFF2-40B4-BE49-F238E27FC236}">
+                <a16:creationId xmlns:a16="http://schemas.microsoft.com/office/drawing/2014/main" id="{319A9A44-A51B-463F-8753-64C77E25F26B}"/>
+              </a:ext>
+            </a:extLst>
+          </p:cNvPr>
+          <p:cNvCxnSpPr/>
+          <p:nvPr/>
+        </p:nvCxnSpPr>
+        <p:spPr>
+          <a:xfrm>
+            <a:off x="6248401" y="2153741"/>
+            <a:ext cx="6035039" cy="0"/>
+          </a:xfrm>
+          <a:prstGeom prst="line">
+            <a:avLst/>
+          </a:prstGeom>
+        </p:spPr>
+        <p:style>
+          <a:lnRef idx="1">
+            <a:schemeClr val="accent1"/>
+          </a:lnRef>
+          <a:fillRef idx="0">
+            <a:schemeClr val="accent1"/>
+          </a:fillRef>
+          <a:effectRef idx="0">
+            <a:schemeClr val="accent1"/>
+          </a:effectRef>
+          <a:fontRef idx="minor">
+            <a:schemeClr val="tx1"/>
+          </a:fontRef>
+        </p:style>
+      </p:cxnSp>
+      <p:cxnSp>
+        <p:nvCxnSpPr>
+          <p:cNvPr id="15" name="Connecteur droit 14">
+            <a:extLst>
+              <a:ext uri="{FF2B5EF4-FFF2-40B4-BE49-F238E27FC236}">
+                <a16:creationId xmlns:a16="http://schemas.microsoft.com/office/drawing/2014/main" id="{8537097E-2F0E-4573-86F6-E91444DF16AB}"/>
+              </a:ext>
+            </a:extLst>
+          </p:cNvPr>
+          <p:cNvCxnSpPr/>
+          <p:nvPr/>
+        </p:nvCxnSpPr>
+        <p:spPr>
+          <a:xfrm>
+            <a:off x="6248400" y="2153741"/>
+            <a:ext cx="0" cy="1473810"/>
+          </a:xfrm>
+          <a:prstGeom prst="line">
+            <a:avLst/>
+          </a:prstGeom>
+        </p:spPr>
+        <p:style>
+          <a:lnRef idx="1">
+            <a:schemeClr val="accent1"/>
+          </a:lnRef>
+          <a:fillRef idx="0">
+            <a:schemeClr val="accent1"/>
+          </a:fillRef>
+          <a:effectRef idx="0">
+            <a:schemeClr val="accent1"/>
+          </a:effectRef>
+          <a:fontRef idx="minor">
+            <a:schemeClr val="tx1"/>
+          </a:fontRef>
+        </p:style>
+      </p:cxnSp>
+      <p:cxnSp>
+        <p:nvCxnSpPr>
+          <p:cNvPr id="17" name="Connecteur droit 16">
+            <a:extLst>
+              <a:ext uri="{FF2B5EF4-FFF2-40B4-BE49-F238E27FC236}">
+                <a16:creationId xmlns:a16="http://schemas.microsoft.com/office/drawing/2014/main" id="{C439D5A8-3535-4342-86E6-B59A91883042}"/>
+              </a:ext>
+            </a:extLst>
+          </p:cNvPr>
+          <p:cNvCxnSpPr/>
+          <p:nvPr/>
+        </p:nvCxnSpPr>
+        <p:spPr>
+          <a:xfrm flipH="1">
+            <a:off x="-282633" y="3627551"/>
+            <a:ext cx="6531033" cy="0"/>
+          </a:xfrm>
+          <a:prstGeom prst="line">
+            <a:avLst/>
+          </a:prstGeom>
+        </p:spPr>
+        <p:style>
+          <a:lnRef idx="1">
+            <a:schemeClr val="accent1"/>
+          </a:lnRef>
+          <a:fillRef idx="0">
+            <a:schemeClr val="accent1"/>
+          </a:fillRef>
+          <a:effectRef idx="0">
+            <a:schemeClr val="accent1"/>
+          </a:effectRef>
+          <a:fontRef idx="minor">
+            <a:schemeClr val="tx1"/>
+          </a:fontRef>
+        </p:style>
+      </p:cxnSp>
+      <p:cxnSp>
+        <p:nvCxnSpPr>
+          <p:cNvPr id="19" name="Connecteur droit 18">
+            <a:extLst>
+              <a:ext uri="{FF2B5EF4-FFF2-40B4-BE49-F238E27FC236}">
+                <a16:creationId xmlns:a16="http://schemas.microsoft.com/office/drawing/2014/main" id="{6A31DEFD-A5AD-4019-8E4B-D0F6749FC040}"/>
+              </a:ext>
+            </a:extLst>
+          </p:cNvPr>
+          <p:cNvCxnSpPr>
+            <a:endCxn id="1032" idx="3"/>
+          </p:cNvCxnSpPr>
+          <p:nvPr/>
+        </p:nvCxnSpPr>
+        <p:spPr>
+          <a:xfrm>
+            <a:off x="6248400" y="3627551"/>
+            <a:ext cx="1183178" cy="784842"/>
+          </a:xfrm>
+          <a:prstGeom prst="line">
+            <a:avLst/>
+          </a:prstGeom>
+        </p:spPr>
+        <p:style>
+          <a:lnRef idx="1">
+            <a:schemeClr val="accent1"/>
+          </a:lnRef>
+          <a:fillRef idx="0">
+            <a:schemeClr val="accent1"/>
+          </a:fillRef>
+          <a:effectRef idx="0">
+            <a:schemeClr val="accent1"/>
+          </a:effectRef>
+          <a:fontRef idx="minor">
+            <a:schemeClr val="tx1"/>
+          </a:fontRef>
+        </p:style>
+      </p:cxnSp>
+      <p:cxnSp>
+        <p:nvCxnSpPr>
+          <p:cNvPr id="21" name="Connecteur droit 20">
+            <a:extLst>
+              <a:ext uri="{FF2B5EF4-FFF2-40B4-BE49-F238E27FC236}">
+                <a16:creationId xmlns:a16="http://schemas.microsoft.com/office/drawing/2014/main" id="{FDCEBFEA-7A87-4C68-9735-AAF0BF596FBA}"/>
+              </a:ext>
+            </a:extLst>
+          </p:cNvPr>
+          <p:cNvCxnSpPr>
+            <a:stCxn id="1032" idx="3"/>
+          </p:cNvCxnSpPr>
+          <p:nvPr/>
+        </p:nvCxnSpPr>
+        <p:spPr>
+          <a:xfrm>
+            <a:off x="7431578" y="4412393"/>
+            <a:ext cx="4760422" cy="23494"/>
+          </a:xfrm>
+          <a:prstGeom prst="line">
+            <a:avLst/>
+          </a:prstGeom>
+        </p:spPr>
+        <p:style>
+          <a:lnRef idx="1">
+            <a:schemeClr val="accent1"/>
+          </a:lnRef>
+          <a:fillRef idx="0">
+            <a:schemeClr val="accent1"/>
+          </a:fillRef>
+          <a:effectRef idx="0">
+            <a:schemeClr val="accent1"/>
+          </a:effectRef>
+          <a:fontRef idx="minor">
+            <a:schemeClr val="tx1"/>
+          </a:fontRef>
+        </p:style>
+      </p:cxnSp>
+      <p:cxnSp>
+        <p:nvCxnSpPr>
+          <p:cNvPr id="23" name="Connecteur droit 22">
+            <a:extLst>
+              <a:ext uri="{FF2B5EF4-FFF2-40B4-BE49-F238E27FC236}">
+                <a16:creationId xmlns:a16="http://schemas.microsoft.com/office/drawing/2014/main" id="{5ACD8E6B-694C-4A90-95E3-E013E367275F}"/>
+              </a:ext>
+            </a:extLst>
+          </p:cNvPr>
+          <p:cNvCxnSpPr>
+            <a:stCxn id="1032" idx="3"/>
+          </p:cNvCxnSpPr>
+          <p:nvPr/>
+        </p:nvCxnSpPr>
+        <p:spPr>
+          <a:xfrm>
+            <a:off x="7431578" y="4412393"/>
+            <a:ext cx="0" cy="2503796"/>
+          </a:xfrm>
+          <a:prstGeom prst="line">
+            <a:avLst/>
+          </a:prstGeom>
+        </p:spPr>
+        <p:style>
+          <a:lnRef idx="1">
+            <a:schemeClr val="accent1"/>
+          </a:lnRef>
+          <a:fillRef idx="0">
+            <a:schemeClr val="accent1"/>
+          </a:fillRef>
+          <a:effectRef idx="0">
+            <a:schemeClr val="accent1"/>
+          </a:effectRef>
+          <a:fontRef idx="minor">
+            <a:schemeClr val="tx1"/>
+          </a:fontRef>
+        </p:style>
+      </p:cxnSp>
+      <p:cxnSp>
+        <p:nvCxnSpPr>
+          <p:cNvPr id="25" name="Connecteur droit 24">
+            <a:extLst>
+              <a:ext uri="{FF2B5EF4-FFF2-40B4-BE49-F238E27FC236}">
+                <a16:creationId xmlns:a16="http://schemas.microsoft.com/office/drawing/2014/main" id="{33DDF1FA-41A8-4D9A-BD3C-CA920A2A2549}"/>
+              </a:ext>
+            </a:extLst>
+          </p:cNvPr>
+          <p:cNvCxnSpPr/>
+          <p:nvPr/>
+        </p:nvCxnSpPr>
+        <p:spPr>
+          <a:xfrm flipH="1">
+            <a:off x="-116378" y="5261784"/>
+            <a:ext cx="7547956" cy="0"/>
+          </a:xfrm>
+          <a:prstGeom prst="line">
+            <a:avLst/>
+          </a:prstGeom>
+        </p:spPr>
+        <p:style>
+          <a:lnRef idx="1">
+            <a:schemeClr val="accent1"/>
+          </a:lnRef>
+          <a:fillRef idx="0">
+            <a:schemeClr val="accent1"/>
+          </a:fillRef>
+          <a:effectRef idx="0">
+            <a:schemeClr val="accent1"/>
+          </a:effectRef>
+          <a:fontRef idx="minor">
+            <a:schemeClr val="tx1"/>
+          </a:fontRef>
+        </p:style>
+      </p:cxnSp>
     </p:spTree>
     <p:extLst>
       <p:ext uri="{BB962C8B-B14F-4D97-AF65-F5344CB8AC3E}">
-        <p14:creationId xmlns:p14="http://schemas.microsoft.com/office/powerpoint/2010/main" val="2471766703"/>
+        <p14:creationId xmlns:p14="http://schemas.microsoft.com/office/powerpoint/2010/main" val="217553722"/>
       </p:ext>
     </p:extLst>
   </p:cSld>
@@ -7236,804 +7290,6 @@
 </file>
 
 <file path=ppt/slides/slide7.xml><?xml version="1.0" encoding="utf-8"?>
-<p:sld xmlns:a="http://schemas.openxmlformats.org/drawingml/2006/main" xmlns:r="http://schemas.openxmlformats.org/officeDocument/2006/relationships" xmlns:p="http://schemas.openxmlformats.org/presentationml/2006/main">
-  <p:cSld>
-    <p:bg>
-      <p:bgPr>
-        <a:solidFill>
-          <a:schemeClr val="bg1"/>
-        </a:solidFill>
-        <a:effectLst/>
-      </p:bgPr>
-    </p:bg>
-    <p:spTree>
-      <p:nvGrpSpPr>
-        <p:cNvPr id="1" name=""/>
-        <p:cNvGrpSpPr/>
-        <p:nvPr/>
-      </p:nvGrpSpPr>
-      <p:grpSpPr>
-        <a:xfrm>
-          <a:off x="0" y="0"/>
-          <a:ext cx="0" cy="0"/>
-          <a:chOff x="0" y="0"/>
-          <a:chExt cx="0" cy="0"/>
-        </a:xfrm>
-      </p:grpSpPr>
-      <p:sp useBgFill="1">
-        <p:nvSpPr>
-          <p:cNvPr id="82" name="Rectangle 81">
-            <a:extLst>
-              <a:ext uri="{FF2B5EF4-FFF2-40B4-BE49-F238E27FC236}">
-                <a16:creationId xmlns:a16="http://schemas.microsoft.com/office/drawing/2014/main" id="{7666DE11-17E1-4DC7-B2B7-6DA2E6A9CE8B}"/>
-              </a:ext>
-              <a:ext uri="{C183D7F6-B498-43B3-948B-1728B52AA6E4}">
-                <adec:decorative xmlns:adec="http://schemas.microsoft.com/office/drawing/2017/decorative" val="1"/>
-              </a:ext>
-            </a:extLst>
-          </p:cNvPr>
-          <p:cNvSpPr>
-            <a:spLocks noGrp="1" noRot="1" noChangeAspect="1" noMove="1" noResize="1" noEditPoints="1" noAdjustHandles="1" noChangeArrowheads="1" noChangeShapeType="1" noTextEdit="1"/>
-          </p:cNvSpPr>
-          <p:nvPr>
-            <p:extLst>
-              <p:ext uri="{386F3935-93C4-4BCD-93E2-E3B085C9AB24}">
-                <p16:designElem xmlns:p16="http://schemas.microsoft.com/office/powerpoint/2015/main" val="1"/>
-              </p:ext>
-            </p:extLst>
-          </p:nvPr>
-        </p:nvSpPr>
-        <p:spPr>
-          <a:xfrm>
-            <a:off x="0" y="0"/>
-            <a:ext cx="12192000" cy="6858000"/>
-          </a:xfrm>
-          <a:prstGeom prst="rect">
-            <a:avLst/>
-          </a:prstGeom>
-          <a:ln w="12700" cap="flat" cmpd="sng" algn="ctr">
-            <a:noFill/>
-            <a:prstDash val="solid"/>
-            <a:miter lim="800000"/>
-          </a:ln>
-          <a:effectLst/>
-          <a:extLst>
-            <a:ext uri="{91240B29-F687-4F45-9708-019B960494DF}">
-              <a14:hiddenLine xmlns:a14="http://schemas.microsoft.com/office/drawing/2010/main" w="12700" cap="flat" cmpd="sng" algn="ctr">
-                <a:solidFill>
-                  <a:schemeClr val="accent1">
-                    <a:shade val="50000"/>
-                  </a:schemeClr>
-                </a:solidFill>
-                <a:prstDash val="solid"/>
-                <a:miter lim="800000"/>
-              </a14:hiddenLine>
-            </a:ext>
-          </a:extLst>
-        </p:spPr>
-        <p:style>
-          <a:lnRef idx="2">
-            <a:schemeClr val="accent1">
-              <a:shade val="50000"/>
-            </a:schemeClr>
-          </a:lnRef>
-          <a:fillRef idx="1">
-            <a:schemeClr val="accent1"/>
-          </a:fillRef>
-          <a:effectRef idx="0">
-            <a:schemeClr val="accent1"/>
-          </a:effectRef>
-          <a:fontRef idx="minor">
-            <a:schemeClr val="lt1"/>
-          </a:fontRef>
-        </p:style>
-        <p:txBody>
-          <a:bodyPr rtlCol="0" anchor="ctr"/>
-          <a:lstStyle/>
-          <a:p>
-            <a:pPr algn="ctr"/>
-            <a:endParaRPr lang="en-US"/>
-          </a:p>
-        </p:txBody>
-      </p:sp>
-      <p:sp>
-        <p:nvSpPr>
-          <p:cNvPr id="84" name="Rectangle 83">
-            <a:extLst>
-              <a:ext uri="{FF2B5EF4-FFF2-40B4-BE49-F238E27FC236}">
-                <a16:creationId xmlns:a16="http://schemas.microsoft.com/office/drawing/2014/main" id="{B52E493E-0B27-4F3C-AA01-17F0A2564112}"/>
-              </a:ext>
-              <a:ext uri="{C183D7F6-B498-43B3-948B-1728B52AA6E4}">
-                <adec:decorative xmlns:adec="http://schemas.microsoft.com/office/drawing/2017/decorative" val="1"/>
-              </a:ext>
-            </a:extLst>
-          </p:cNvPr>
-          <p:cNvSpPr>
-            <a:spLocks noGrp="1" noRot="1" noChangeAspect="1" noMove="1" noResize="1" noEditPoints="1" noAdjustHandles="1" noChangeArrowheads="1" noChangeShapeType="1" noTextEdit="1"/>
-          </p:cNvSpPr>
-          <p:nvPr>
-            <p:extLst>
-              <p:ext uri="{386F3935-93C4-4BCD-93E2-E3B085C9AB24}">
-                <p16:designElem xmlns:p16="http://schemas.microsoft.com/office/powerpoint/2015/main" val="1"/>
-              </p:ext>
-            </p:extLst>
-          </p:nvPr>
-        </p:nvSpPr>
-        <p:spPr>
-          <a:xfrm>
-            <a:off x="4837042" y="1"/>
-            <a:ext cx="7354956" cy="6857999"/>
-          </a:xfrm>
-          <a:prstGeom prst="rect">
-            <a:avLst/>
-          </a:prstGeom>
-          <a:solidFill>
-            <a:srgbClr val="82766A">
-              <a:alpha val="15000"/>
-            </a:srgbClr>
-          </a:solidFill>
-          <a:ln>
-            <a:noFill/>
-          </a:ln>
-        </p:spPr>
-        <p:style>
-          <a:lnRef idx="2">
-            <a:schemeClr val="accent1">
-              <a:shade val="50000"/>
-            </a:schemeClr>
-          </a:lnRef>
-          <a:fillRef idx="1">
-            <a:schemeClr val="accent1"/>
-          </a:fillRef>
-          <a:effectRef idx="0">
-            <a:schemeClr val="accent1"/>
-          </a:effectRef>
-          <a:fontRef idx="minor">
-            <a:schemeClr val="lt1"/>
-          </a:fontRef>
-        </p:style>
-        <p:txBody>
-          <a:bodyPr rtlCol="0" anchor="ctr"/>
-          <a:lstStyle/>
-          <a:p>
-            <a:pPr algn="ctr"/>
-            <a:endParaRPr lang="en-US"/>
-          </a:p>
-        </p:txBody>
-      </p:sp>
-      <p:sp>
-        <p:nvSpPr>
-          <p:cNvPr id="2" name="Titre 1">
-            <a:extLst>
-              <a:ext uri="{FF2B5EF4-FFF2-40B4-BE49-F238E27FC236}">
-                <a16:creationId xmlns:a16="http://schemas.microsoft.com/office/drawing/2014/main" id="{78898CC1-8AF5-413F-A24E-7C7EDF26EE42}"/>
-              </a:ext>
-            </a:extLst>
-          </p:cNvPr>
-          <p:cNvSpPr>
-            <a:spLocks noGrp="1"/>
-          </p:cNvSpPr>
-          <p:nvPr>
-            <p:ph type="title"/>
-          </p:nvPr>
-        </p:nvSpPr>
-        <p:spPr>
-          <a:xfrm>
-            <a:off x="6248400" y="609601"/>
-            <a:ext cx="5943595" cy="1216024"/>
-          </a:xfrm>
-        </p:spPr>
-        <p:txBody>
-          <a:bodyPr>
-            <a:normAutofit/>
-          </a:bodyPr>
-          <a:lstStyle/>
-          <a:p>
-            <a:pPr algn="ctr"/>
-            <a:r>
-              <a:rPr lang="fr-FR" sz="2000" dirty="0"/>
-              <a:t>Fonctionnalités :</a:t>
-            </a:r>
-          </a:p>
-        </p:txBody>
-      </p:sp>
-      <p:pic>
-        <p:nvPicPr>
-          <p:cNvPr id="6" name="Espace réservé du contenu 5" descr="Une image contenant texte, personne, extérieur, gens&#10;&#10;Description générée automatiquement">
-            <a:extLst>
-              <a:ext uri="{FF2B5EF4-FFF2-40B4-BE49-F238E27FC236}">
-                <a16:creationId xmlns:a16="http://schemas.microsoft.com/office/drawing/2014/main" id="{E0291456-98CE-422A-AB10-9B790E2479F3}"/>
-              </a:ext>
-            </a:extLst>
-          </p:cNvPr>
-          <p:cNvPicPr>
-            <a:picLocks noChangeAspect="1"/>
-          </p:cNvPicPr>
-          <p:nvPr/>
-        </p:nvPicPr>
-        <p:blipFill rotWithShape="1">
-          <a:blip r:embed="rId2">
-            <a:extLst>
-              <a:ext uri="{28A0092B-C50C-407E-A947-70E740481C1C}">
-                <a14:useLocalDpi xmlns:a14="http://schemas.microsoft.com/office/drawing/2010/main" val="0"/>
-              </a:ext>
-            </a:extLst>
-          </a:blip>
-          <a:srcRect r="7138" b="1"/>
-          <a:stretch/>
-        </p:blipFill>
-        <p:spPr>
-          <a:xfrm>
-            <a:off x="4" y="1"/>
-            <a:ext cx="7037119" cy="6857999"/>
-          </a:xfrm>
-          <a:custGeom>
-            <a:avLst/>
-            <a:gdLst/>
-            <a:ahLst/>
-            <a:cxnLst/>
-            <a:rect l="l" t="t" r="r" b="b"/>
-            <a:pathLst>
-              <a:path w="7037119" h="6857999">
-                <a:moveTo>
-                  <a:pt x="0" y="0"/>
-                </a:moveTo>
-                <a:lnTo>
-                  <a:pt x="6964192" y="0"/>
-                </a:lnTo>
-                <a:lnTo>
-                  <a:pt x="6958160" y="70714"/>
-                </a:lnTo>
-                <a:cubicBezTo>
-                  <a:pt x="6951001" y="105084"/>
-                  <a:pt x="6926062" y="125041"/>
-                  <a:pt x="6922034" y="154825"/>
-                </a:cubicBezTo>
-                <a:cubicBezTo>
-                  <a:pt x="6888738" y="184083"/>
-                  <a:pt x="6875225" y="272154"/>
-                  <a:pt x="6864029" y="301580"/>
-                </a:cubicBezTo>
-                <a:cubicBezTo>
-                  <a:pt x="6850541" y="382476"/>
-                  <a:pt x="6857766" y="543626"/>
-                  <a:pt x="6842156" y="642469"/>
-                </a:cubicBezTo>
-                <a:cubicBezTo>
-                  <a:pt x="6828250" y="715553"/>
-                  <a:pt x="6832569" y="729947"/>
-                  <a:pt x="6802087" y="818449"/>
-                </a:cubicBezTo>
-                <a:cubicBezTo>
-                  <a:pt x="6828151" y="830541"/>
-                  <a:pt x="6801214" y="859084"/>
-                  <a:pt x="6798684" y="875396"/>
-                </a:cubicBezTo>
-                <a:cubicBezTo>
-                  <a:pt x="6792414" y="895056"/>
-                  <a:pt x="6762852" y="912465"/>
-                  <a:pt x="6756983" y="952375"/>
-                </a:cubicBezTo>
-                <a:lnTo>
-                  <a:pt x="6758478" y="972424"/>
-                </a:lnTo>
-                <a:lnTo>
-                  <a:pt x="6752651" y="996407"/>
-                </a:lnTo>
-                <a:cubicBezTo>
-                  <a:pt x="6744201" y="1040546"/>
-                  <a:pt x="6736270" y="1086165"/>
-                  <a:pt x="6716997" y="1091248"/>
-                </a:cubicBezTo>
-                <a:cubicBezTo>
-                  <a:pt x="6678332" y="1122349"/>
-                  <a:pt x="6707411" y="1240829"/>
-                  <a:pt x="6657090" y="1307489"/>
-                </a:cubicBezTo>
-                <a:cubicBezTo>
-                  <a:pt x="6621135" y="1444387"/>
-                  <a:pt x="6524184" y="1590429"/>
-                  <a:pt x="6508075" y="1709568"/>
-                </a:cubicBezTo>
-                <a:cubicBezTo>
-                  <a:pt x="6474780" y="1738828"/>
-                  <a:pt x="6473953" y="1782449"/>
-                  <a:pt x="6462759" y="1811874"/>
-                </a:cubicBezTo>
-                <a:cubicBezTo>
-                  <a:pt x="6449270" y="1892769"/>
-                  <a:pt x="6399402" y="2130120"/>
-                  <a:pt x="6383790" y="2228963"/>
-                </a:cubicBezTo>
-                <a:cubicBezTo>
-                  <a:pt x="6369883" y="2302046"/>
-                  <a:pt x="6399578" y="2316440"/>
-                  <a:pt x="6369096" y="2404942"/>
-                </a:cubicBezTo>
-                <a:cubicBezTo>
-                  <a:pt x="6395161" y="2417035"/>
-                  <a:pt x="6368224" y="2445577"/>
-                  <a:pt x="6365696" y="2461889"/>
-                </a:cubicBezTo>
-                <a:cubicBezTo>
-                  <a:pt x="6359423" y="2481550"/>
-                  <a:pt x="6329861" y="2498958"/>
-                  <a:pt x="6323990" y="2538869"/>
-                </a:cubicBezTo>
-                <a:cubicBezTo>
-                  <a:pt x="6317721" y="2603362"/>
-                  <a:pt x="6317811" y="2723423"/>
-                  <a:pt x="6299971" y="2852842"/>
-                </a:cubicBezTo>
-                <a:cubicBezTo>
-                  <a:pt x="6296888" y="2889820"/>
-                  <a:pt x="6314227" y="2924069"/>
-                  <a:pt x="6305256" y="2965146"/>
-                </a:cubicBezTo>
-                <a:lnTo>
-                  <a:pt x="6297430" y="3010980"/>
-                </a:lnTo>
-                <a:lnTo>
-                  <a:pt x="6301903" y="3017531"/>
-                </a:lnTo>
-                <a:lnTo>
-                  <a:pt x="6312288" y="3141762"/>
-                </a:lnTo>
-                <a:cubicBezTo>
-                  <a:pt x="6310891" y="3148458"/>
-                  <a:pt x="6311653" y="3156601"/>
-                  <a:pt x="6317307" y="3167974"/>
-                </a:cubicBezTo>
-                <a:lnTo>
-                  <a:pt x="6319343" y="3170223"/>
-                </a:lnTo>
-                <a:lnTo>
-                  <a:pt x="6388791" y="3425292"/>
-                </a:lnTo>
-                <a:cubicBezTo>
-                  <a:pt x="6411564" y="3519098"/>
-                  <a:pt x="6451294" y="3670230"/>
-                  <a:pt x="6473625" y="3778499"/>
-                </a:cubicBezTo>
-                <a:cubicBezTo>
-                  <a:pt x="6461715" y="3876413"/>
-                  <a:pt x="6479795" y="3911499"/>
-                  <a:pt x="6488572" y="4010514"/>
-                </a:cubicBezTo>
-                <a:cubicBezTo>
-                  <a:pt x="6537658" y="4041328"/>
-                  <a:pt x="6522549" y="4094791"/>
-                  <a:pt x="6542727" y="4142824"/>
-                </a:cubicBezTo>
-                <a:cubicBezTo>
-                  <a:pt x="6562367" y="4174785"/>
-                  <a:pt x="6560025" y="4194356"/>
-                  <a:pt x="6574700" y="4253089"/>
-                </a:cubicBezTo>
-                <a:lnTo>
-                  <a:pt x="6630782" y="4495230"/>
-                </a:lnTo>
-                <a:cubicBezTo>
-                  <a:pt x="6629041" y="4518096"/>
-                  <a:pt x="6642831" y="4583613"/>
-                  <a:pt x="6657121" y="4592798"/>
-                </a:cubicBezTo>
-                <a:cubicBezTo>
-                  <a:pt x="6662404" y="4605798"/>
-                  <a:pt x="6661388" y="4622935"/>
-                  <a:pt x="6675304" y="4625784"/>
-                </a:cubicBezTo>
-                <a:cubicBezTo>
-                  <a:pt x="6692614" y="4632048"/>
-                  <a:pt x="6678575" y="4686348"/>
-                  <a:pt x="6695194" y="4674587"/>
-                </a:cubicBezTo>
-                <a:cubicBezTo>
-                  <a:pt x="6692850" y="4684186"/>
-                  <a:pt x="6692968" y="4695174"/>
-                  <a:pt x="6694674" y="4706669"/>
-                </a:cubicBezTo>
-                <a:lnTo>
-                  <a:pt x="6696125" y="4712312"/>
-                </a:lnTo>
-                <a:lnTo>
-                  <a:pt x="6683308" y="4752491"/>
-                </a:lnTo>
-                <a:cubicBezTo>
-                  <a:pt x="6668335" y="4814629"/>
-                  <a:pt x="6667993" y="4870176"/>
-                  <a:pt x="6662625" y="4924134"/>
-                </a:cubicBezTo>
-                <a:cubicBezTo>
-                  <a:pt x="6658601" y="5004697"/>
-                  <a:pt x="6700287" y="4943260"/>
-                  <a:pt x="6666282" y="5049729"/>
-                </a:cubicBezTo>
-                <a:cubicBezTo>
-                  <a:pt x="6680923" y="5057425"/>
-                  <a:pt x="6681720" y="5069899"/>
-                  <a:pt x="6674923" y="5092608"/>
-                </a:cubicBezTo>
-                <a:cubicBezTo>
-                  <a:pt x="6674055" y="5131530"/>
-                  <a:pt x="6710642" y="5120894"/>
-                  <a:pt x="6688949" y="5164561"/>
-                </a:cubicBezTo>
-                <a:lnTo>
-                  <a:pt x="6713476" y="5227429"/>
-                </a:lnTo>
-                <a:cubicBezTo>
-                  <a:pt x="6707551" y="5224995"/>
-                  <a:pt x="6700321" y="5279972"/>
-                  <a:pt x="6699741" y="5295738"/>
-                </a:cubicBezTo>
-                <a:cubicBezTo>
-                  <a:pt x="6701613" y="5328539"/>
-                  <a:pt x="6674230" y="5338382"/>
-                  <a:pt x="6698438" y="5353315"/>
-                </a:cubicBezTo>
-                <a:lnTo>
-                  <a:pt x="6705394" y="5356747"/>
-                </a:lnTo>
-                <a:cubicBezTo>
-                  <a:pt x="6705576" y="5359175"/>
-                  <a:pt x="6705758" y="5361603"/>
-                  <a:pt x="6705941" y="5364029"/>
-                </a:cubicBezTo>
-                <a:cubicBezTo>
-                  <a:pt x="6705372" y="5367899"/>
-                  <a:pt x="6703413" y="5370023"/>
-                  <a:pt x="6698760" y="5369188"/>
-                </a:cubicBezTo>
-                <a:cubicBezTo>
-                  <a:pt x="6715543" y="5400565"/>
-                  <a:pt x="6682626" y="5434448"/>
-                  <a:pt x="6674560" y="5465115"/>
-                </a:cubicBezTo>
-                <a:cubicBezTo>
-                  <a:pt x="6691190" y="5489165"/>
-                  <a:pt x="6702277" y="5478984"/>
-                  <a:pt x="6698322" y="5543278"/>
-                </a:cubicBezTo>
-                <a:lnTo>
-                  <a:pt x="6673987" y="5606762"/>
-                </a:lnTo>
-                <a:lnTo>
-                  <a:pt x="6665359" y="5656986"/>
-                </a:lnTo>
-                <a:lnTo>
-                  <a:pt x="6718420" y="5747675"/>
-                </a:lnTo>
-                <a:cubicBezTo>
-                  <a:pt x="6736039" y="5788270"/>
-                  <a:pt x="6794550" y="5740224"/>
-                  <a:pt x="6786357" y="5797270"/>
-                </a:cubicBezTo>
-                <a:cubicBezTo>
-                  <a:pt x="6803000" y="5835160"/>
-                  <a:pt x="6831082" y="5856958"/>
-                  <a:pt x="6834299" y="5897781"/>
-                </a:cubicBezTo>
-                <a:cubicBezTo>
-                  <a:pt x="6850938" y="5902014"/>
-                  <a:pt x="6860579" y="5910872"/>
-                  <a:pt x="6848771" y="5936497"/>
-                </a:cubicBezTo>
-                <a:lnTo>
-                  <a:pt x="6883460" y="6064046"/>
-                </a:lnTo>
-                <a:cubicBezTo>
-                  <a:pt x="6906450" y="6070324"/>
-                  <a:pt x="6870051" y="6102610"/>
-                  <a:pt x="6896072" y="6107188"/>
-                </a:cubicBezTo>
-                <a:cubicBezTo>
-                  <a:pt x="6912283" y="6129421"/>
-                  <a:pt x="6963567" y="6167207"/>
-                  <a:pt x="6980725" y="6197444"/>
-                </a:cubicBezTo>
-                <a:cubicBezTo>
-                  <a:pt x="6947762" y="6297975"/>
-                  <a:pt x="6995609" y="6226141"/>
-                  <a:pt x="6999028" y="6288610"/>
-                </a:cubicBezTo>
-                <a:cubicBezTo>
-                  <a:pt x="6997432" y="6346629"/>
-                  <a:pt x="7058551" y="6337651"/>
-                  <a:pt x="7021306" y="6426700"/>
-                </a:cubicBezTo>
-                <a:cubicBezTo>
-                  <a:pt x="7020466" y="6447474"/>
-                  <a:pt x="7026793" y="6469543"/>
-                  <a:pt x="7033259" y="6489284"/>
-                </a:cubicBezTo>
-                <a:lnTo>
-                  <a:pt x="7037119" y="6501140"/>
-                </a:lnTo>
-                <a:lnTo>
-                  <a:pt x="7037119" y="6557754"/>
-                </a:lnTo>
-                <a:lnTo>
-                  <a:pt x="7031649" y="6569925"/>
-                </a:lnTo>
-                <a:cubicBezTo>
-                  <a:pt x="7023197" y="6591634"/>
-                  <a:pt x="7028560" y="6588450"/>
-                  <a:pt x="7011548" y="6615002"/>
-                </a:cubicBezTo>
-                <a:cubicBezTo>
-                  <a:pt x="7016567" y="6637881"/>
-                  <a:pt x="7011534" y="6732922"/>
-                  <a:pt x="7021837" y="6743644"/>
-                </a:cubicBezTo>
-                <a:cubicBezTo>
-                  <a:pt x="7023032" y="6757943"/>
-                  <a:pt x="7005198" y="6842091"/>
-                  <a:pt x="7006394" y="6856390"/>
-                </a:cubicBezTo>
-                <a:lnTo>
-                  <a:pt x="7037119" y="6856494"/>
-                </a:lnTo>
-                <a:lnTo>
-                  <a:pt x="7037119" y="6857999"/>
-                </a:lnTo>
-                <a:lnTo>
-                  <a:pt x="0" y="6857999"/>
-                </a:lnTo>
-                <a:close/>
-              </a:path>
-            </a:pathLst>
-          </a:custGeom>
-        </p:spPr>
-      </p:pic>
-      <p:sp>
-        <p:nvSpPr>
-          <p:cNvPr id="143" name="Content Placeholder 142">
-            <a:extLst>
-              <a:ext uri="{FF2B5EF4-FFF2-40B4-BE49-F238E27FC236}">
-                <a16:creationId xmlns:a16="http://schemas.microsoft.com/office/drawing/2014/main" id="{960457FB-C86A-4851-A61E-E8A7882FA89D}"/>
-              </a:ext>
-            </a:extLst>
-          </p:cNvPr>
-          <p:cNvSpPr>
-            <a:spLocks noGrp="1"/>
-          </p:cNvSpPr>
-          <p:nvPr>
-            <p:ph idx="1"/>
-          </p:nvPr>
-        </p:nvSpPr>
-        <p:spPr>
-          <a:xfrm>
-            <a:off x="7099958" y="1756831"/>
-            <a:ext cx="5029201" cy="4107021"/>
-          </a:xfrm>
-        </p:spPr>
-        <p:txBody>
-          <a:bodyPr>
-            <a:normAutofit/>
-          </a:bodyPr>
-          <a:lstStyle/>
-          <a:p>
-            <a:r>
-              <a:rPr lang="en-US" dirty="0" err="1"/>
-              <a:t>Créer</a:t>
-            </a:r>
-            <a:r>
-              <a:rPr lang="en-US" dirty="0"/>
-              <a:t> et </a:t>
-            </a:r>
-            <a:r>
-              <a:rPr lang="en-US" dirty="0" err="1"/>
-              <a:t>administrer</a:t>
-            </a:r>
-            <a:r>
-              <a:rPr lang="en-US" dirty="0"/>
-              <a:t> des </a:t>
-            </a:r>
-            <a:r>
-              <a:rPr lang="en-US" dirty="0" err="1"/>
-              <a:t>évènements</a:t>
-            </a:r>
-            <a:r>
-              <a:rPr lang="en-US" dirty="0"/>
-              <a:t> publics</a:t>
-            </a:r>
-          </a:p>
-          <a:p>
-            <a:r>
-              <a:rPr lang="en-US" dirty="0" err="1"/>
-              <a:t>Mettre</a:t>
-            </a:r>
-            <a:r>
-              <a:rPr lang="en-US" dirty="0"/>
-              <a:t> </a:t>
-            </a:r>
-            <a:r>
-              <a:rPr lang="en-US" dirty="0" err="1"/>
-              <a:t>en</a:t>
-            </a:r>
-            <a:r>
-              <a:rPr lang="en-US" dirty="0"/>
-              <a:t> </a:t>
-            </a:r>
-            <a:r>
-              <a:rPr lang="en-US" dirty="0" err="1"/>
-              <a:t>ligne</a:t>
-            </a:r>
-            <a:r>
-              <a:rPr lang="en-US" dirty="0"/>
-              <a:t> des images </a:t>
-            </a:r>
-            <a:r>
-              <a:rPr lang="en-US" dirty="0" err="1"/>
-              <a:t>liées</a:t>
-            </a:r>
-            <a:r>
-              <a:rPr lang="en-US" dirty="0"/>
-              <a:t> à un </a:t>
-            </a:r>
-            <a:r>
-              <a:rPr lang="en-US" dirty="0" err="1"/>
-              <a:t>évènement</a:t>
-            </a:r>
-            <a:endParaRPr lang="en-US" dirty="0"/>
-          </a:p>
-          <a:p>
-            <a:r>
-              <a:rPr lang="en-US" dirty="0" err="1"/>
-              <a:t>Système</a:t>
-            </a:r>
-            <a:r>
-              <a:rPr lang="en-US" dirty="0"/>
-              <a:t> de salon </a:t>
-            </a:r>
-            <a:r>
-              <a:rPr lang="en-US" dirty="0" err="1"/>
-              <a:t>textuel</a:t>
-            </a:r>
-            <a:endParaRPr lang="en-US" dirty="0"/>
-          </a:p>
-          <a:p>
-            <a:r>
-              <a:rPr lang="en-US" dirty="0"/>
-              <a:t>Tendances </a:t>
-            </a:r>
-            <a:r>
-              <a:rPr lang="en-US" dirty="0" err="1"/>
-              <a:t>actualisées</a:t>
-            </a:r>
-            <a:r>
-              <a:rPr lang="en-US" dirty="0"/>
-              <a:t> </a:t>
-            </a:r>
-            <a:r>
-              <a:rPr lang="en-US" dirty="0" err="1"/>
-              <a:t>régulièrement</a:t>
-            </a:r>
-            <a:endParaRPr lang="en-US" dirty="0"/>
-          </a:p>
-          <a:p>
-            <a:r>
-              <a:rPr lang="en-US" dirty="0"/>
-              <a:t>Carte avec les </a:t>
-            </a:r>
-            <a:r>
-              <a:rPr lang="en-US" dirty="0" err="1"/>
-              <a:t>évènements</a:t>
-            </a:r>
-            <a:r>
-              <a:rPr lang="en-US" dirty="0"/>
-              <a:t> </a:t>
-            </a:r>
-            <a:r>
-              <a:rPr lang="en-US" dirty="0" err="1"/>
-              <a:t>en</a:t>
-            </a:r>
-            <a:r>
-              <a:rPr lang="en-US" dirty="0"/>
-              <a:t> </a:t>
-            </a:r>
-            <a:r>
-              <a:rPr lang="en-US" dirty="0" err="1"/>
-              <a:t>cours</a:t>
-            </a:r>
-            <a:endParaRPr lang="en-US" dirty="0"/>
-          </a:p>
-          <a:p>
-            <a:r>
-              <a:rPr lang="en-US" dirty="0" err="1"/>
-              <a:t>Archivage</a:t>
-            </a:r>
-            <a:r>
-              <a:rPr lang="en-US" dirty="0"/>
-              <a:t> des publications</a:t>
-            </a:r>
-          </a:p>
-          <a:p>
-            <a:r>
-              <a:rPr lang="en-US" dirty="0"/>
-              <a:t>Discussion commune et/</a:t>
-            </a:r>
-            <a:r>
-              <a:rPr lang="en-US" dirty="0" err="1"/>
-              <a:t>ou</a:t>
-            </a:r>
-            <a:r>
-              <a:rPr lang="en-US" dirty="0"/>
-              <a:t> </a:t>
-            </a:r>
-            <a:r>
-              <a:rPr lang="en-US" dirty="0" err="1"/>
-              <a:t>création</a:t>
-            </a:r>
-            <a:r>
-              <a:rPr lang="en-US" dirty="0"/>
-              <a:t> de </a:t>
-            </a:r>
-            <a:r>
-              <a:rPr lang="en-US" dirty="0" err="1"/>
-              <a:t>fils</a:t>
-            </a:r>
-            <a:endParaRPr lang="en-US" dirty="0"/>
-          </a:p>
-          <a:p>
-            <a:endParaRPr lang="en-US" dirty="0"/>
-          </a:p>
-        </p:txBody>
-      </p:sp>
-      <p:sp>
-        <p:nvSpPr>
-          <p:cNvPr id="7" name="ZoneTexte 6">
-            <a:extLst>
-              <a:ext uri="{FF2B5EF4-FFF2-40B4-BE49-F238E27FC236}">
-                <a16:creationId xmlns:a16="http://schemas.microsoft.com/office/drawing/2014/main" id="{5180A1DF-7B67-4FA0-8836-93B36DAE0B4B}"/>
-              </a:ext>
-            </a:extLst>
-          </p:cNvPr>
-          <p:cNvSpPr txBox="1"/>
-          <p:nvPr/>
-        </p:nvSpPr>
-        <p:spPr>
-          <a:xfrm>
-            <a:off x="11558493" y="6488668"/>
-            <a:ext cx="633507" cy="369332"/>
-          </a:xfrm>
-          <a:prstGeom prst="rect">
-            <a:avLst/>
-          </a:prstGeom>
-          <a:noFill/>
-        </p:spPr>
-        <p:txBody>
-          <a:bodyPr wrap="none" rtlCol="0">
-            <a:spAutoFit/>
-          </a:bodyPr>
-          <a:lstStyle/>
-          <a:p>
-            <a:r>
-              <a:rPr lang="fr-FR" dirty="0">
-                <a:latin typeface="Liberation Sans" panose="020B0604020202020204" pitchFamily="34" charset="0"/>
-                <a:ea typeface="Liberation Sans" panose="020B0604020202020204" pitchFamily="34" charset="0"/>
-                <a:cs typeface="Liberation Sans" panose="020B0604020202020204" pitchFamily="34" charset="0"/>
-              </a:rPr>
-              <a:t>6 / 8</a:t>
-            </a:r>
-          </a:p>
-        </p:txBody>
-      </p:sp>
-    </p:spTree>
-    <p:extLst>
-      <p:ext uri="{BB962C8B-B14F-4D97-AF65-F5344CB8AC3E}">
-        <p14:creationId xmlns:p14="http://schemas.microsoft.com/office/powerpoint/2010/main" val="1335327988"/>
-      </p:ext>
-    </p:extLst>
-  </p:cSld>
-  <p:clrMapOvr>
-    <a:masterClrMapping/>
-  </p:clrMapOvr>
-</p:sld>
-</file>
-
-<file path=ppt/slides/slide8.xml><?xml version="1.0" encoding="utf-8"?>
 <p:sld xmlns:a="http://schemas.openxmlformats.org/drawingml/2006/main" xmlns:r="http://schemas.openxmlformats.org/officeDocument/2006/relationships" xmlns:p="http://schemas.openxmlformats.org/presentationml/2006/main">
   <p:cSld>
     <p:spTree>
@@ -8050,12 +7306,42 @@
           <a:chExt cx="0" cy="0"/>
         </a:xfrm>
       </p:grpSpPr>
+      <p:pic>
+        <p:nvPicPr>
+          <p:cNvPr id="10" name="Image 9">
+            <a:extLst>
+              <a:ext uri="{FF2B5EF4-FFF2-40B4-BE49-F238E27FC236}">
+                <a16:creationId xmlns:a16="http://schemas.microsoft.com/office/drawing/2014/main" id="{A7908789-7F33-479C-868F-7088F15DAC2D}"/>
+              </a:ext>
+            </a:extLst>
+          </p:cNvPr>
+          <p:cNvPicPr>
+            <a:picLocks noChangeAspect="1"/>
+          </p:cNvPicPr>
+          <p:nvPr/>
+        </p:nvPicPr>
+        <p:blipFill>
+          <a:blip r:embed="rId2"/>
+          <a:stretch>
+            <a:fillRect/>
+          </a:stretch>
+        </p:blipFill>
+        <p:spPr>
+          <a:xfrm>
+            <a:off x="0" y="556953"/>
+            <a:ext cx="12187552" cy="6301047"/>
+          </a:xfrm>
+          <a:prstGeom prst="rect">
+            <a:avLst/>
+          </a:prstGeom>
+        </p:spPr>
+      </p:pic>
       <p:sp>
         <p:nvSpPr>
           <p:cNvPr id="2" name="Titre 1">
             <a:extLst>
               <a:ext uri="{FF2B5EF4-FFF2-40B4-BE49-F238E27FC236}">
-                <a16:creationId xmlns:a16="http://schemas.microsoft.com/office/drawing/2014/main" id="{3BC3DB0C-0842-490E-8CB0-934585378ACF}"/>
+                <a16:creationId xmlns:a16="http://schemas.microsoft.com/office/drawing/2014/main" id="{6905F23D-AB2E-4016-81A2-C83CE91B2F30}"/>
               </a:ext>
             </a:extLst>
           </p:cNvPr>
@@ -8066,44 +7352,68 @@
             <p:ph type="title"/>
           </p:nvPr>
         </p:nvSpPr>
-        <p:spPr/>
-        <p:txBody>
-          <a:bodyPr/>
+        <p:spPr>
+          <a:xfrm>
+            <a:off x="0" y="0"/>
+            <a:ext cx="5657492" cy="487273"/>
+          </a:xfrm>
+        </p:spPr>
+        <p:txBody>
+          <a:bodyPr>
+            <a:normAutofit fontScale="90000"/>
+          </a:bodyPr>
           <a:lstStyle/>
           <a:p>
-            <a:endParaRPr lang="fr-FR"/>
-          </a:p>
-        </p:txBody>
-      </p:sp>
-      <p:sp>
-        <p:nvSpPr>
-          <p:cNvPr id="3" name="Espace réservé du contenu 2">
-            <a:extLst>
-              <a:ext uri="{FF2B5EF4-FFF2-40B4-BE49-F238E27FC236}">
-                <a16:creationId xmlns:a16="http://schemas.microsoft.com/office/drawing/2014/main" id="{27A6A17C-361E-42B6-8622-C6AAC5F4D231}"/>
-              </a:ext>
-            </a:extLst>
-          </p:cNvPr>
-          <p:cNvSpPr>
-            <a:spLocks noGrp="1"/>
-          </p:cNvSpPr>
-          <p:nvPr>
-            <p:ph idx="1"/>
-          </p:nvPr>
-        </p:nvSpPr>
-        <p:spPr/>
-        <p:txBody>
-          <a:bodyPr/>
+            <a:r>
+              <a:rPr lang="fr-FR" sz="3300" cap="none" spc="0" dirty="0"/>
+              <a:t>Planification prévisionnelle :</a:t>
+            </a:r>
+          </a:p>
+        </p:txBody>
+      </p:sp>
+      <p:sp>
+        <p:nvSpPr>
+          <p:cNvPr id="4" name="ZoneTexte 3">
+            <a:extLst>
+              <a:ext uri="{FF2B5EF4-FFF2-40B4-BE49-F238E27FC236}">
+                <a16:creationId xmlns:a16="http://schemas.microsoft.com/office/drawing/2014/main" id="{930383B1-E332-4C5C-BCBE-525A7C493A03}"/>
+              </a:ext>
+            </a:extLst>
+          </p:cNvPr>
+          <p:cNvSpPr txBox="1"/>
+          <p:nvPr/>
+        </p:nvSpPr>
+        <p:spPr>
+          <a:xfrm>
+            <a:off x="11587941" y="6483927"/>
+            <a:ext cx="695499" cy="374073"/>
+          </a:xfrm>
+          <a:prstGeom prst="rect">
+            <a:avLst/>
+          </a:prstGeom>
+          <a:noFill/>
+        </p:spPr>
+        <p:txBody>
+          <a:bodyPr wrap="square" rtlCol="0">
+            <a:spAutoFit/>
+          </a:bodyPr>
           <a:lstStyle/>
           <a:p>
-            <a:endParaRPr lang="fr-FR"/>
+            <a:r>
+              <a:rPr lang="fr-FR" b="1" dirty="0">
+                <a:latin typeface="Liberation Sans" panose="020B0604020202020204" pitchFamily="34" charset="0"/>
+                <a:ea typeface="Liberation Sans" panose="020B0604020202020204" pitchFamily="34" charset="0"/>
+                <a:cs typeface="Liberation Sans" panose="020B0604020202020204" pitchFamily="34" charset="0"/>
+              </a:rPr>
+              <a:t>7 / 7</a:t>
+            </a:r>
           </a:p>
         </p:txBody>
       </p:sp>
     </p:spTree>
     <p:extLst>
       <p:ext uri="{BB962C8B-B14F-4D97-AF65-F5344CB8AC3E}">
-        <p14:creationId xmlns:p14="http://schemas.microsoft.com/office/powerpoint/2010/main" val="1873116506"/>
+        <p14:creationId xmlns:p14="http://schemas.microsoft.com/office/powerpoint/2010/main" val="2763426079"/>
       </p:ext>
     </p:extLst>
   </p:cSld>
@@ -8312,4 +7622,47 @@
     </a:ext>
   </a:extLst>
 </a:theme>
+</file>
+
+<file path=ppt/theme/themeOverride1.xml><?xml version="1.0" encoding="utf-8"?>
+<a:themeOverride xmlns:a="http://schemas.openxmlformats.org/drawingml/2006/main">
+  <a:clrScheme name="Archive">
+    <a:dk1>
+      <a:sysClr val="windowText" lastClr="000000"/>
+    </a:dk1>
+    <a:lt1>
+      <a:sysClr val="window" lastClr="FFFFFF"/>
+    </a:lt1>
+    <a:dk2>
+      <a:srgbClr val="353B3D"/>
+    </a:dk2>
+    <a:lt2>
+      <a:srgbClr val="EEECEA"/>
+    </a:lt2>
+    <a:accent1>
+      <a:srgbClr val="A65E5E"/>
+    </a:accent1>
+    <a:accent2>
+      <a:srgbClr val="9D6053"/>
+    </a:accent2>
+    <a:accent3>
+      <a:srgbClr val="968274"/>
+    </a:accent3>
+    <a:accent4>
+      <a:srgbClr val="878079"/>
+    </a:accent4>
+    <a:accent5>
+      <a:srgbClr val="6C737A"/>
+    </a:accent5>
+    <a:accent6>
+      <a:srgbClr val="697777"/>
+    </a:accent6>
+    <a:hlink>
+      <a:srgbClr val="A25872"/>
+    </a:hlink>
+    <a:folHlink>
+      <a:srgbClr val="667A7E"/>
+    </a:folHlink>
+  </a:clrScheme>
+</a:themeOverride>
 </file>
</xml_diff>